<commit_message>
[main] Update Part.1.2, add EX.
</commit_message>
<xml_diff>
--- a/Resources/Part1/Part1_Resources.pptx
+++ b/Resources/Part1/Part1_Resources.pptx
@@ -11,6 +11,10 @@
     <p:sldId id="259" r:id="rId5"/>
     <p:sldId id="260" r:id="rId6"/>
     <p:sldId id="261" r:id="rId7"/>
+    <p:sldId id="262" r:id="rId8"/>
+    <p:sldId id="263" r:id="rId9"/>
+    <p:sldId id="264" r:id="rId10"/>
+    <p:sldId id="265" r:id="rId11"/>
   </p:sldIdLst>
   <p:sldSz cx="12192000" cy="6858000"/>
   <p:notesSz cx="6858000" cy="9144000"/>
@@ -13569,7 +13573,7 @@
           <a:p>
             <a:fld id="{1A086832-2622-4354-BD9D-64D40320B320}" type="datetimeFigureOut">
               <a:rPr kumimoji="1" lang="ja-JP" altLang="en-US" smtClean="0"/>
-              <a:t>2024/9/29</a:t>
+              <a:t>2024/11/2</a:t>
             </a:fld>
             <a:endParaRPr kumimoji="1" lang="ja-JP" altLang="en-US"/>
           </a:p>
@@ -13799,7 +13803,7 @@
           <a:p>
             <a:fld id="{1A086832-2622-4354-BD9D-64D40320B320}" type="datetimeFigureOut">
               <a:rPr kumimoji="1" lang="ja-JP" altLang="en-US" smtClean="0"/>
-              <a:t>2024/9/29</a:t>
+              <a:t>2024/11/2</a:t>
             </a:fld>
             <a:endParaRPr kumimoji="1" lang="ja-JP" altLang="en-US"/>
           </a:p>
@@ -14039,7 +14043,7 @@
           <a:p>
             <a:fld id="{1A086832-2622-4354-BD9D-64D40320B320}" type="datetimeFigureOut">
               <a:rPr kumimoji="1" lang="ja-JP" altLang="en-US" smtClean="0"/>
-              <a:t>2024/9/29</a:t>
+              <a:t>2024/11/2</a:t>
             </a:fld>
             <a:endParaRPr kumimoji="1" lang="ja-JP" altLang="en-US"/>
           </a:p>
@@ -14269,7 +14273,7 @@
           <a:p>
             <a:fld id="{1A086832-2622-4354-BD9D-64D40320B320}" type="datetimeFigureOut">
               <a:rPr kumimoji="1" lang="ja-JP" altLang="en-US" smtClean="0"/>
-              <a:t>2024/9/29</a:t>
+              <a:t>2024/11/2</a:t>
             </a:fld>
             <a:endParaRPr kumimoji="1" lang="ja-JP" altLang="en-US"/>
           </a:p>
@@ -14544,7 +14548,7 @@
           <a:p>
             <a:fld id="{1A086832-2622-4354-BD9D-64D40320B320}" type="datetimeFigureOut">
               <a:rPr kumimoji="1" lang="ja-JP" altLang="en-US" smtClean="0"/>
-              <a:t>2024/9/29</a:t>
+              <a:t>2024/11/2</a:t>
             </a:fld>
             <a:endParaRPr kumimoji="1" lang="ja-JP" altLang="en-US"/>
           </a:p>
@@ -14873,7 +14877,7 @@
           <a:p>
             <a:fld id="{1A086832-2622-4354-BD9D-64D40320B320}" type="datetimeFigureOut">
               <a:rPr kumimoji="1" lang="ja-JP" altLang="en-US" smtClean="0"/>
-              <a:t>2024/9/29</a:t>
+              <a:t>2024/11/2</a:t>
             </a:fld>
             <a:endParaRPr kumimoji="1" lang="ja-JP" altLang="en-US"/>
           </a:p>
@@ -15349,7 +15353,7 @@
           <a:p>
             <a:fld id="{1A086832-2622-4354-BD9D-64D40320B320}" type="datetimeFigureOut">
               <a:rPr kumimoji="1" lang="ja-JP" altLang="en-US" smtClean="0"/>
-              <a:t>2024/9/29</a:t>
+              <a:t>2024/11/2</a:t>
             </a:fld>
             <a:endParaRPr kumimoji="1" lang="ja-JP" altLang="en-US"/>
           </a:p>
@@ -15490,7 +15494,7 @@
           <a:p>
             <a:fld id="{1A086832-2622-4354-BD9D-64D40320B320}" type="datetimeFigureOut">
               <a:rPr kumimoji="1" lang="ja-JP" altLang="en-US" smtClean="0"/>
-              <a:t>2024/9/29</a:t>
+              <a:t>2024/11/2</a:t>
             </a:fld>
             <a:endParaRPr kumimoji="1" lang="ja-JP" altLang="en-US"/>
           </a:p>
@@ -15603,7 +15607,7 @@
           <a:p>
             <a:fld id="{1A086832-2622-4354-BD9D-64D40320B320}" type="datetimeFigureOut">
               <a:rPr kumimoji="1" lang="ja-JP" altLang="en-US" smtClean="0"/>
-              <a:t>2024/9/29</a:t>
+              <a:t>2024/11/2</a:t>
             </a:fld>
             <a:endParaRPr kumimoji="1" lang="ja-JP" altLang="en-US"/>
           </a:p>
@@ -15946,7 +15950,7 @@
           <a:p>
             <a:fld id="{1A086832-2622-4354-BD9D-64D40320B320}" type="datetimeFigureOut">
               <a:rPr kumimoji="1" lang="ja-JP" altLang="en-US" smtClean="0"/>
-              <a:t>2024/9/29</a:t>
+              <a:t>2024/11/2</a:t>
             </a:fld>
             <a:endParaRPr kumimoji="1" lang="ja-JP" altLang="en-US"/>
           </a:p>
@@ -16234,7 +16238,7 @@
           <a:p>
             <a:fld id="{1A086832-2622-4354-BD9D-64D40320B320}" type="datetimeFigureOut">
               <a:rPr kumimoji="1" lang="ja-JP" altLang="en-US" smtClean="0"/>
-              <a:t>2024/9/29</a:t>
+              <a:t>2024/11/2</a:t>
             </a:fld>
             <a:endParaRPr kumimoji="1" lang="ja-JP" altLang="en-US"/>
           </a:p>
@@ -16507,7 +16511,7 @@
           <a:p>
             <a:fld id="{1A086832-2622-4354-BD9D-64D40320B320}" type="datetimeFigureOut">
               <a:rPr kumimoji="1" lang="ja-JP" altLang="en-US" smtClean="0"/>
-              <a:t>2024/9/29</a:t>
+              <a:t>2024/11/2</a:t>
             </a:fld>
             <a:endParaRPr kumimoji="1" lang="ja-JP" altLang="en-US"/>
           </a:p>
@@ -18022,6 +18026,317 @@
     <p:extLst>
       <p:ext uri="{BB962C8B-B14F-4D97-AF65-F5344CB8AC3E}">
         <p14:creationId xmlns:p14="http://schemas.microsoft.com/office/powerpoint/2010/main" val="180846524"/>
+      </p:ext>
+    </p:extLst>
+  </p:cSld>
+  <p:clrMapOvr>
+    <a:masterClrMapping/>
+  </p:clrMapOvr>
+</p:sld>
+</file>
+
+<file path=ppt/slides/slide10.xml><?xml version="1.0" encoding="utf-8"?>
+<p:sld xmlns:a="http://schemas.openxmlformats.org/drawingml/2006/main" xmlns:r="http://schemas.openxmlformats.org/officeDocument/2006/relationships" xmlns:p="http://schemas.openxmlformats.org/presentationml/2006/main">
+  <p:cSld>
+    <p:spTree>
+      <p:nvGrpSpPr>
+        <p:cNvPr id="1" name=""/>
+        <p:cNvGrpSpPr/>
+        <p:nvPr/>
+      </p:nvGrpSpPr>
+      <p:grpSpPr>
+        <a:xfrm>
+          <a:off x="0" y="0"/>
+          <a:ext cx="0" cy="0"/>
+          <a:chOff x="0" y="0"/>
+          <a:chExt cx="0" cy="0"/>
+        </a:xfrm>
+      </p:grpSpPr>
+      <p:pic>
+        <p:nvPicPr>
+          <p:cNvPr id="4" name="図 3">
+            <a:extLst>
+              <a:ext uri="{FF2B5EF4-FFF2-40B4-BE49-F238E27FC236}">
+                <a16:creationId xmlns:a16="http://schemas.microsoft.com/office/drawing/2014/main" id="{232005F9-0501-463F-A920-D2F1BEDE3348}"/>
+              </a:ext>
+            </a:extLst>
+          </p:cNvPr>
+          <p:cNvPicPr>
+            <a:picLocks noChangeAspect="1"/>
+          </p:cNvPicPr>
+          <p:nvPr/>
+        </p:nvPicPr>
+        <p:blipFill>
+          <a:blip r:embed="rId2"/>
+          <a:stretch>
+            <a:fillRect/>
+          </a:stretch>
+        </p:blipFill>
+        <p:spPr>
+          <a:xfrm>
+            <a:off x="2200275" y="685800"/>
+            <a:ext cx="7791450" cy="5486400"/>
+          </a:xfrm>
+          <a:prstGeom prst="rect">
+            <a:avLst/>
+          </a:prstGeom>
+        </p:spPr>
+      </p:pic>
+      <p:sp>
+        <p:nvSpPr>
+          <p:cNvPr id="5" name="正方形/長方形 4">
+            <a:extLst>
+              <a:ext uri="{FF2B5EF4-FFF2-40B4-BE49-F238E27FC236}">
+                <a16:creationId xmlns:a16="http://schemas.microsoft.com/office/drawing/2014/main" id="{B1501D10-2805-4692-98B6-21FE09391555}"/>
+              </a:ext>
+            </a:extLst>
+          </p:cNvPr>
+          <p:cNvSpPr/>
+          <p:nvPr/>
+        </p:nvSpPr>
+        <p:spPr>
+          <a:xfrm>
+            <a:off x="4724400" y="5400675"/>
+            <a:ext cx="533400" cy="333374"/>
+          </a:xfrm>
+          <a:prstGeom prst="rect">
+            <a:avLst/>
+          </a:prstGeom>
+          <a:noFill/>
+          <a:ln w="25400">
+            <a:solidFill>
+              <a:srgbClr val="FF0000"/>
+            </a:solidFill>
+          </a:ln>
+        </p:spPr>
+        <p:style>
+          <a:lnRef idx="2">
+            <a:schemeClr val="accent1">
+              <a:shade val="50000"/>
+            </a:schemeClr>
+          </a:lnRef>
+          <a:fillRef idx="1">
+            <a:schemeClr val="accent1"/>
+          </a:fillRef>
+          <a:effectRef idx="0">
+            <a:schemeClr val="accent1"/>
+          </a:effectRef>
+          <a:fontRef idx="minor">
+            <a:schemeClr val="lt1"/>
+          </a:fontRef>
+        </p:style>
+        <p:txBody>
+          <a:bodyPr rtlCol="0" anchor="ctr"/>
+          <a:lstStyle/>
+          <a:p>
+            <a:pPr algn="ctr"/>
+            <a:endParaRPr lang="en-US"/>
+          </a:p>
+        </p:txBody>
+      </p:sp>
+      <p:sp>
+        <p:nvSpPr>
+          <p:cNvPr id="6" name="正方形/長方形 5">
+            <a:extLst>
+              <a:ext uri="{FF2B5EF4-FFF2-40B4-BE49-F238E27FC236}">
+                <a16:creationId xmlns:a16="http://schemas.microsoft.com/office/drawing/2014/main" id="{3F61A940-CD29-45E1-8D29-0ACEAE030C7A}"/>
+              </a:ext>
+            </a:extLst>
+          </p:cNvPr>
+          <p:cNvSpPr/>
+          <p:nvPr/>
+        </p:nvSpPr>
+        <p:spPr>
+          <a:xfrm>
+            <a:off x="6029325" y="5243513"/>
+            <a:ext cx="533400" cy="252412"/>
+          </a:xfrm>
+          <a:prstGeom prst="rect">
+            <a:avLst/>
+          </a:prstGeom>
+          <a:noFill/>
+          <a:ln w="25400">
+            <a:solidFill>
+              <a:srgbClr val="FF0000"/>
+            </a:solidFill>
+          </a:ln>
+        </p:spPr>
+        <p:style>
+          <a:lnRef idx="2">
+            <a:schemeClr val="accent1">
+              <a:shade val="50000"/>
+            </a:schemeClr>
+          </a:lnRef>
+          <a:fillRef idx="1">
+            <a:schemeClr val="accent1"/>
+          </a:fillRef>
+          <a:effectRef idx="0">
+            <a:schemeClr val="accent1"/>
+          </a:effectRef>
+          <a:fontRef idx="minor">
+            <a:schemeClr val="lt1"/>
+          </a:fontRef>
+        </p:style>
+        <p:txBody>
+          <a:bodyPr rtlCol="0" anchor="ctr"/>
+          <a:lstStyle/>
+          <a:p>
+            <a:pPr algn="ctr"/>
+            <a:endParaRPr lang="en-US"/>
+          </a:p>
+        </p:txBody>
+      </p:sp>
+      <p:sp>
+        <p:nvSpPr>
+          <p:cNvPr id="7" name="正方形/長方形 6">
+            <a:extLst>
+              <a:ext uri="{FF2B5EF4-FFF2-40B4-BE49-F238E27FC236}">
+                <a16:creationId xmlns:a16="http://schemas.microsoft.com/office/drawing/2014/main" id="{4593035A-A16B-4AAA-BCC6-C7AADC717C16}"/>
+              </a:ext>
+            </a:extLst>
+          </p:cNvPr>
+          <p:cNvSpPr/>
+          <p:nvPr/>
+        </p:nvSpPr>
+        <p:spPr>
+          <a:xfrm>
+            <a:off x="9163049" y="4090987"/>
+            <a:ext cx="657225" cy="509587"/>
+          </a:xfrm>
+          <a:prstGeom prst="rect">
+            <a:avLst/>
+          </a:prstGeom>
+          <a:noFill/>
+          <a:ln w="25400">
+            <a:solidFill>
+              <a:srgbClr val="FF0000"/>
+            </a:solidFill>
+          </a:ln>
+        </p:spPr>
+        <p:style>
+          <a:lnRef idx="2">
+            <a:schemeClr val="accent1">
+              <a:shade val="50000"/>
+            </a:schemeClr>
+          </a:lnRef>
+          <a:fillRef idx="1">
+            <a:schemeClr val="accent1"/>
+          </a:fillRef>
+          <a:effectRef idx="0">
+            <a:schemeClr val="accent1"/>
+          </a:effectRef>
+          <a:fontRef idx="minor">
+            <a:schemeClr val="lt1"/>
+          </a:fontRef>
+        </p:style>
+        <p:txBody>
+          <a:bodyPr rtlCol="0" anchor="ctr"/>
+          <a:lstStyle/>
+          <a:p>
+            <a:pPr algn="ctr"/>
+            <a:endParaRPr lang="en-US"/>
+          </a:p>
+        </p:txBody>
+      </p:sp>
+      <p:cxnSp>
+        <p:nvCxnSpPr>
+          <p:cNvPr id="10" name="直線コネクタ 9">
+            <a:extLst>
+              <a:ext uri="{FF2B5EF4-FFF2-40B4-BE49-F238E27FC236}">
+                <a16:creationId xmlns:a16="http://schemas.microsoft.com/office/drawing/2014/main" id="{56B8F6DF-16A7-4BED-8C53-43C9709E2AA7}"/>
+              </a:ext>
+            </a:extLst>
+          </p:cNvPr>
+          <p:cNvCxnSpPr>
+            <a:cxnSpLocks/>
+          </p:cNvCxnSpPr>
+          <p:nvPr/>
+        </p:nvCxnSpPr>
+        <p:spPr>
+          <a:xfrm>
+            <a:off x="5353050" y="5257801"/>
+            <a:ext cx="504825" cy="0"/>
+          </a:xfrm>
+          <a:prstGeom prst="line">
+            <a:avLst/>
+          </a:prstGeom>
+          <a:ln w="28575">
+            <a:solidFill>
+              <a:srgbClr val="FF0000"/>
+            </a:solidFill>
+          </a:ln>
+        </p:spPr>
+        <p:style>
+          <a:lnRef idx="1">
+            <a:schemeClr val="accent1"/>
+          </a:lnRef>
+          <a:fillRef idx="0">
+            <a:schemeClr val="accent1"/>
+          </a:fillRef>
+          <a:effectRef idx="0">
+            <a:schemeClr val="accent1"/>
+          </a:effectRef>
+          <a:fontRef idx="minor">
+            <a:schemeClr val="tx1"/>
+          </a:fontRef>
+        </p:style>
+      </p:cxnSp>
+      <p:sp>
+        <p:nvSpPr>
+          <p:cNvPr id="12" name="正方形/長方形 11">
+            <a:extLst>
+              <a:ext uri="{FF2B5EF4-FFF2-40B4-BE49-F238E27FC236}">
+                <a16:creationId xmlns:a16="http://schemas.microsoft.com/office/drawing/2014/main" id="{70498CE6-98D3-4522-A656-AAF936B13819}"/>
+              </a:ext>
+            </a:extLst>
+          </p:cNvPr>
+          <p:cNvSpPr/>
+          <p:nvPr/>
+        </p:nvSpPr>
+        <p:spPr>
+          <a:xfrm>
+            <a:off x="6962774" y="1310803"/>
+            <a:ext cx="1857376" cy="298922"/>
+          </a:xfrm>
+          <a:prstGeom prst="rect">
+            <a:avLst/>
+          </a:prstGeom>
+          <a:noFill/>
+          <a:ln w="25400">
+            <a:solidFill>
+              <a:srgbClr val="FF0000"/>
+            </a:solidFill>
+          </a:ln>
+        </p:spPr>
+        <p:style>
+          <a:lnRef idx="2">
+            <a:schemeClr val="accent1">
+              <a:shade val="50000"/>
+            </a:schemeClr>
+          </a:lnRef>
+          <a:fillRef idx="1">
+            <a:schemeClr val="accent1"/>
+          </a:fillRef>
+          <a:effectRef idx="0">
+            <a:schemeClr val="accent1"/>
+          </a:effectRef>
+          <a:fontRef idx="minor">
+            <a:schemeClr val="lt1"/>
+          </a:fontRef>
+        </p:style>
+        <p:txBody>
+          <a:bodyPr rtlCol="0" anchor="ctr"/>
+          <a:lstStyle/>
+          <a:p>
+            <a:pPr algn="ctr"/>
+            <a:endParaRPr lang="en-US"/>
+          </a:p>
+        </p:txBody>
+      </p:sp>
+    </p:spTree>
+    <p:extLst>
+      <p:ext uri="{BB962C8B-B14F-4D97-AF65-F5344CB8AC3E}">
+        <p14:creationId xmlns:p14="http://schemas.microsoft.com/office/powerpoint/2010/main" val="3256643030"/>
       </p:ext>
     </p:extLst>
   </p:cSld>
@@ -21544,6 +21859,1209 @@
 </p:sld>
 </file>
 
+<file path=ppt/slides/slide7.xml><?xml version="1.0" encoding="utf-8"?>
+<p:sld xmlns:a="http://schemas.openxmlformats.org/drawingml/2006/main" xmlns:r="http://schemas.openxmlformats.org/officeDocument/2006/relationships" xmlns:p="http://schemas.openxmlformats.org/presentationml/2006/main">
+  <p:cSld>
+    <p:spTree>
+      <p:nvGrpSpPr>
+        <p:cNvPr id="1" name=""/>
+        <p:cNvGrpSpPr/>
+        <p:nvPr/>
+      </p:nvGrpSpPr>
+      <p:grpSpPr>
+        <a:xfrm>
+          <a:off x="0" y="0"/>
+          <a:ext cx="0" cy="0"/>
+          <a:chOff x="0" y="0"/>
+          <a:chExt cx="0" cy="0"/>
+        </a:xfrm>
+      </p:grpSpPr>
+      <p:pic>
+        <p:nvPicPr>
+          <p:cNvPr id="4" name="図 3">
+            <a:extLst>
+              <a:ext uri="{FF2B5EF4-FFF2-40B4-BE49-F238E27FC236}">
+                <a16:creationId xmlns:a16="http://schemas.microsoft.com/office/drawing/2014/main" id="{1E7FAB03-D48D-473B-B873-38BE93E12318}"/>
+              </a:ext>
+            </a:extLst>
+          </p:cNvPr>
+          <p:cNvPicPr>
+            <a:picLocks noChangeAspect="1"/>
+          </p:cNvPicPr>
+          <p:nvPr/>
+        </p:nvPicPr>
+        <p:blipFill>
+          <a:blip r:embed="rId2"/>
+          <a:stretch>
+            <a:fillRect/>
+          </a:stretch>
+        </p:blipFill>
+        <p:spPr>
+          <a:xfrm>
+            <a:off x="3733800" y="652462"/>
+            <a:ext cx="4724400" cy="5553075"/>
+          </a:xfrm>
+          <a:prstGeom prst="rect">
+            <a:avLst/>
+          </a:prstGeom>
+        </p:spPr>
+      </p:pic>
+      <p:sp>
+        <p:nvSpPr>
+          <p:cNvPr id="5" name="正方形/長方形 4">
+            <a:extLst>
+              <a:ext uri="{FF2B5EF4-FFF2-40B4-BE49-F238E27FC236}">
+                <a16:creationId xmlns:a16="http://schemas.microsoft.com/office/drawing/2014/main" id="{3E4997B6-F98C-41E3-BC77-5C13DC9D21ED}"/>
+              </a:ext>
+            </a:extLst>
+          </p:cNvPr>
+          <p:cNvSpPr/>
+          <p:nvPr/>
+        </p:nvSpPr>
+        <p:spPr>
+          <a:xfrm>
+            <a:off x="5410200" y="1419225"/>
+            <a:ext cx="333375" cy="447675"/>
+          </a:xfrm>
+          <a:prstGeom prst="rect">
+            <a:avLst/>
+          </a:prstGeom>
+          <a:noFill/>
+          <a:ln w="25400">
+            <a:solidFill>
+              <a:srgbClr val="FF0000"/>
+            </a:solidFill>
+          </a:ln>
+        </p:spPr>
+        <p:style>
+          <a:lnRef idx="2">
+            <a:schemeClr val="accent1">
+              <a:shade val="50000"/>
+            </a:schemeClr>
+          </a:lnRef>
+          <a:fillRef idx="1">
+            <a:schemeClr val="accent1"/>
+          </a:fillRef>
+          <a:effectRef idx="0">
+            <a:schemeClr val="accent1"/>
+          </a:effectRef>
+          <a:fontRef idx="minor">
+            <a:schemeClr val="lt1"/>
+          </a:fontRef>
+        </p:style>
+        <p:txBody>
+          <a:bodyPr rtlCol="0" anchor="ctr"/>
+          <a:lstStyle/>
+          <a:p>
+            <a:pPr algn="ctr"/>
+            <a:endParaRPr lang="en-US"/>
+          </a:p>
+        </p:txBody>
+      </p:sp>
+      <p:sp>
+        <p:nvSpPr>
+          <p:cNvPr id="6" name="正方形/長方形 5">
+            <a:extLst>
+              <a:ext uri="{FF2B5EF4-FFF2-40B4-BE49-F238E27FC236}">
+                <a16:creationId xmlns:a16="http://schemas.microsoft.com/office/drawing/2014/main" id="{10588E47-8A5C-4FD3-A9F1-1965F7180DFF}"/>
+              </a:ext>
+            </a:extLst>
+          </p:cNvPr>
+          <p:cNvSpPr/>
+          <p:nvPr/>
+        </p:nvSpPr>
+        <p:spPr>
+          <a:xfrm>
+            <a:off x="5114925" y="4095750"/>
+            <a:ext cx="266700" cy="438150"/>
+          </a:xfrm>
+          <a:prstGeom prst="rect">
+            <a:avLst/>
+          </a:prstGeom>
+          <a:noFill/>
+          <a:ln w="25400">
+            <a:solidFill>
+              <a:srgbClr val="FF0000"/>
+            </a:solidFill>
+          </a:ln>
+        </p:spPr>
+        <p:style>
+          <a:lnRef idx="2">
+            <a:schemeClr val="accent1">
+              <a:shade val="50000"/>
+            </a:schemeClr>
+          </a:lnRef>
+          <a:fillRef idx="1">
+            <a:schemeClr val="accent1"/>
+          </a:fillRef>
+          <a:effectRef idx="0">
+            <a:schemeClr val="accent1"/>
+          </a:effectRef>
+          <a:fontRef idx="minor">
+            <a:schemeClr val="lt1"/>
+          </a:fontRef>
+        </p:style>
+        <p:txBody>
+          <a:bodyPr rtlCol="0" anchor="ctr"/>
+          <a:lstStyle/>
+          <a:p>
+            <a:pPr algn="ctr"/>
+            <a:endParaRPr lang="en-US"/>
+          </a:p>
+        </p:txBody>
+      </p:sp>
+      <p:sp>
+        <p:nvSpPr>
+          <p:cNvPr id="7" name="正方形/長方形 6">
+            <a:extLst>
+              <a:ext uri="{FF2B5EF4-FFF2-40B4-BE49-F238E27FC236}">
+                <a16:creationId xmlns:a16="http://schemas.microsoft.com/office/drawing/2014/main" id="{00728878-DB7A-4B46-B58E-EB03BF1F0AAE}"/>
+              </a:ext>
+            </a:extLst>
+          </p:cNvPr>
+          <p:cNvSpPr/>
+          <p:nvPr/>
+        </p:nvSpPr>
+        <p:spPr>
+          <a:xfrm>
+            <a:off x="5086350" y="4552951"/>
+            <a:ext cx="266700" cy="438150"/>
+          </a:xfrm>
+          <a:prstGeom prst="rect">
+            <a:avLst/>
+          </a:prstGeom>
+          <a:noFill/>
+          <a:ln w="25400">
+            <a:solidFill>
+              <a:srgbClr val="FF0000"/>
+            </a:solidFill>
+          </a:ln>
+        </p:spPr>
+        <p:style>
+          <a:lnRef idx="2">
+            <a:schemeClr val="accent1">
+              <a:shade val="50000"/>
+            </a:schemeClr>
+          </a:lnRef>
+          <a:fillRef idx="1">
+            <a:schemeClr val="accent1"/>
+          </a:fillRef>
+          <a:effectRef idx="0">
+            <a:schemeClr val="accent1"/>
+          </a:effectRef>
+          <a:fontRef idx="minor">
+            <a:schemeClr val="lt1"/>
+          </a:fontRef>
+        </p:style>
+        <p:txBody>
+          <a:bodyPr rtlCol="0" anchor="ctr"/>
+          <a:lstStyle/>
+          <a:p>
+            <a:pPr algn="ctr"/>
+            <a:endParaRPr lang="en-US"/>
+          </a:p>
+        </p:txBody>
+      </p:sp>
+      <p:sp>
+        <p:nvSpPr>
+          <p:cNvPr id="8" name="テキスト ボックス 7">
+            <a:extLst>
+              <a:ext uri="{FF2B5EF4-FFF2-40B4-BE49-F238E27FC236}">
+                <a16:creationId xmlns:a16="http://schemas.microsoft.com/office/drawing/2014/main" id="{9FBD32E6-EF03-4FFF-9E75-526B6B97C2CF}"/>
+              </a:ext>
+            </a:extLst>
+          </p:cNvPr>
+          <p:cNvSpPr txBox="1"/>
+          <p:nvPr/>
+        </p:nvSpPr>
+        <p:spPr>
+          <a:xfrm>
+            <a:off x="1959261" y="1458396"/>
+            <a:ext cx="1059906" cy="369332"/>
+          </a:xfrm>
+          <a:prstGeom prst="rect">
+            <a:avLst/>
+          </a:prstGeom>
+          <a:noFill/>
+        </p:spPr>
+        <p:txBody>
+          <a:bodyPr wrap="none" rtlCol="0">
+            <a:spAutoFit/>
+          </a:bodyPr>
+          <a:lstStyle/>
+          <a:p>
+            <a:r>
+              <a:rPr lang="en-US" dirty="0">
+                <a:latin typeface="Calibri" panose="020F0502020204030204" pitchFamily="34" charset="0"/>
+                <a:cs typeface="Calibri" panose="020F0502020204030204" pitchFamily="34" charset="0"/>
+              </a:rPr>
+              <a:t>X1, 8Mhz</a:t>
+            </a:r>
+          </a:p>
+        </p:txBody>
+      </p:sp>
+      <p:sp>
+        <p:nvSpPr>
+          <p:cNvPr id="9" name="テキスト ボックス 8">
+            <a:extLst>
+              <a:ext uri="{FF2B5EF4-FFF2-40B4-BE49-F238E27FC236}">
+                <a16:creationId xmlns:a16="http://schemas.microsoft.com/office/drawing/2014/main" id="{1D56FB8B-D0FF-45CE-85E2-5318DBBD4670}"/>
+              </a:ext>
+            </a:extLst>
+          </p:cNvPr>
+          <p:cNvSpPr txBox="1"/>
+          <p:nvPr/>
+        </p:nvSpPr>
+        <p:spPr>
+          <a:xfrm>
+            <a:off x="1959261" y="4095750"/>
+            <a:ext cx="1515158" cy="369332"/>
+          </a:xfrm>
+          <a:prstGeom prst="rect">
+            <a:avLst/>
+          </a:prstGeom>
+          <a:noFill/>
+        </p:spPr>
+        <p:txBody>
+          <a:bodyPr wrap="none" rtlCol="0">
+            <a:spAutoFit/>
+          </a:bodyPr>
+          <a:lstStyle/>
+          <a:p>
+            <a:r>
+              <a:rPr lang="en-US" dirty="0">
+                <a:latin typeface="Calibri" panose="020F0502020204030204" pitchFamily="34" charset="0"/>
+                <a:cs typeface="Calibri" panose="020F0502020204030204" pitchFamily="34" charset="0"/>
+              </a:rPr>
+              <a:t>X2, 32.768kHz</a:t>
+            </a:r>
+          </a:p>
+        </p:txBody>
+      </p:sp>
+      <p:sp>
+        <p:nvSpPr>
+          <p:cNvPr id="10" name="テキスト ボックス 9">
+            <a:extLst>
+              <a:ext uri="{FF2B5EF4-FFF2-40B4-BE49-F238E27FC236}">
+                <a16:creationId xmlns:a16="http://schemas.microsoft.com/office/drawing/2014/main" id="{DCBEA8C2-200A-4CDD-9159-B8FA733464DB}"/>
+              </a:ext>
+            </a:extLst>
+          </p:cNvPr>
+          <p:cNvSpPr txBox="1"/>
+          <p:nvPr/>
+        </p:nvSpPr>
+        <p:spPr>
+          <a:xfrm>
+            <a:off x="1959261" y="4700112"/>
+            <a:ext cx="1225015" cy="369332"/>
+          </a:xfrm>
+          <a:prstGeom prst="rect">
+            <a:avLst/>
+          </a:prstGeom>
+          <a:noFill/>
+        </p:spPr>
+        <p:txBody>
+          <a:bodyPr wrap="none" rtlCol="0">
+            <a:spAutoFit/>
+          </a:bodyPr>
+          <a:lstStyle/>
+          <a:p>
+            <a:r>
+              <a:rPr lang="en-US" dirty="0">
+                <a:latin typeface="Calibri" panose="020F0502020204030204" pitchFamily="34" charset="0"/>
+                <a:cs typeface="Calibri" panose="020F0502020204030204" pitchFamily="34" charset="0"/>
+              </a:rPr>
+              <a:t>X3, </a:t>
+            </a:r>
+            <a:r>
+              <a:rPr lang="ja-JP" altLang="en-US" dirty="0">
+                <a:latin typeface="Calibri" panose="020F0502020204030204" pitchFamily="34" charset="0"/>
+                <a:cs typeface="Calibri" panose="020F0502020204030204" pitchFamily="34" charset="0"/>
+              </a:rPr>
+              <a:t>未実装</a:t>
+            </a:r>
+            <a:endParaRPr lang="en-US" dirty="0">
+              <a:latin typeface="Calibri" panose="020F0502020204030204" pitchFamily="34" charset="0"/>
+              <a:cs typeface="Calibri" panose="020F0502020204030204" pitchFamily="34" charset="0"/>
+            </a:endParaRPr>
+          </a:p>
+        </p:txBody>
+      </p:sp>
+      <p:cxnSp>
+        <p:nvCxnSpPr>
+          <p:cNvPr id="12" name="直線矢印コネクタ 11">
+            <a:extLst>
+              <a:ext uri="{FF2B5EF4-FFF2-40B4-BE49-F238E27FC236}">
+                <a16:creationId xmlns:a16="http://schemas.microsoft.com/office/drawing/2014/main" id="{67E64D6C-2ED6-4D90-87DC-6AD1B610AA6D}"/>
+              </a:ext>
+            </a:extLst>
+          </p:cNvPr>
+          <p:cNvCxnSpPr>
+            <a:stCxn id="8" idx="3"/>
+            <a:endCxn id="5" idx="1"/>
+          </p:cNvCxnSpPr>
+          <p:nvPr/>
+        </p:nvCxnSpPr>
+        <p:spPr>
+          <a:xfrm>
+            <a:off x="3019167" y="1643062"/>
+            <a:ext cx="2391033" cy="1"/>
+          </a:xfrm>
+          <a:prstGeom prst="straightConnector1">
+            <a:avLst/>
+          </a:prstGeom>
+          <a:ln>
+            <a:solidFill>
+              <a:srgbClr val="FF0000"/>
+            </a:solidFill>
+            <a:prstDash val="dash"/>
+            <a:tailEnd type="triangle"/>
+          </a:ln>
+        </p:spPr>
+        <p:style>
+          <a:lnRef idx="1">
+            <a:schemeClr val="accent1"/>
+          </a:lnRef>
+          <a:fillRef idx="0">
+            <a:schemeClr val="accent1"/>
+          </a:fillRef>
+          <a:effectRef idx="0">
+            <a:schemeClr val="accent1"/>
+          </a:effectRef>
+          <a:fontRef idx="minor">
+            <a:schemeClr val="tx1"/>
+          </a:fontRef>
+        </p:style>
+      </p:cxnSp>
+      <p:cxnSp>
+        <p:nvCxnSpPr>
+          <p:cNvPr id="13" name="直線矢印コネクタ 12">
+            <a:extLst>
+              <a:ext uri="{FF2B5EF4-FFF2-40B4-BE49-F238E27FC236}">
+                <a16:creationId xmlns:a16="http://schemas.microsoft.com/office/drawing/2014/main" id="{76D63F39-297B-4750-9808-6D084B94C20F}"/>
+              </a:ext>
+            </a:extLst>
+          </p:cNvPr>
+          <p:cNvCxnSpPr>
+            <a:cxnSpLocks/>
+            <a:stCxn id="9" idx="3"/>
+            <a:endCxn id="6" idx="1"/>
+          </p:cNvCxnSpPr>
+          <p:nvPr/>
+        </p:nvCxnSpPr>
+        <p:spPr>
+          <a:xfrm>
+            <a:off x="3474419" y="4280416"/>
+            <a:ext cx="1640506" cy="34409"/>
+          </a:xfrm>
+          <a:prstGeom prst="straightConnector1">
+            <a:avLst/>
+          </a:prstGeom>
+          <a:ln>
+            <a:solidFill>
+              <a:srgbClr val="FF0000"/>
+            </a:solidFill>
+            <a:prstDash val="dash"/>
+            <a:tailEnd type="triangle"/>
+          </a:ln>
+        </p:spPr>
+        <p:style>
+          <a:lnRef idx="1">
+            <a:schemeClr val="accent1"/>
+          </a:lnRef>
+          <a:fillRef idx="0">
+            <a:schemeClr val="accent1"/>
+          </a:fillRef>
+          <a:effectRef idx="0">
+            <a:schemeClr val="accent1"/>
+          </a:effectRef>
+          <a:fontRef idx="minor">
+            <a:schemeClr val="tx1"/>
+          </a:fontRef>
+        </p:style>
+      </p:cxnSp>
+      <p:cxnSp>
+        <p:nvCxnSpPr>
+          <p:cNvPr id="16" name="直線矢印コネクタ 15">
+            <a:extLst>
+              <a:ext uri="{FF2B5EF4-FFF2-40B4-BE49-F238E27FC236}">
+                <a16:creationId xmlns:a16="http://schemas.microsoft.com/office/drawing/2014/main" id="{BC932662-27BD-4D90-B8B7-C0776E9B6A6E}"/>
+              </a:ext>
+            </a:extLst>
+          </p:cNvPr>
+          <p:cNvCxnSpPr>
+            <a:cxnSpLocks/>
+            <a:stCxn id="10" idx="3"/>
+            <a:endCxn id="7" idx="1"/>
+          </p:cNvCxnSpPr>
+          <p:nvPr/>
+        </p:nvCxnSpPr>
+        <p:spPr>
+          <a:xfrm flipV="1">
+            <a:off x="3184276" y="4772026"/>
+            <a:ext cx="1902074" cy="112752"/>
+          </a:xfrm>
+          <a:prstGeom prst="straightConnector1">
+            <a:avLst/>
+          </a:prstGeom>
+          <a:ln>
+            <a:solidFill>
+              <a:srgbClr val="FF0000"/>
+            </a:solidFill>
+            <a:prstDash val="dash"/>
+            <a:tailEnd type="triangle"/>
+          </a:ln>
+        </p:spPr>
+        <p:style>
+          <a:lnRef idx="1">
+            <a:schemeClr val="accent1"/>
+          </a:lnRef>
+          <a:fillRef idx="0">
+            <a:schemeClr val="accent1"/>
+          </a:fillRef>
+          <a:effectRef idx="0">
+            <a:schemeClr val="accent1"/>
+          </a:effectRef>
+          <a:fontRef idx="minor">
+            <a:schemeClr val="tx1"/>
+          </a:fontRef>
+        </p:style>
+      </p:cxnSp>
+    </p:spTree>
+    <p:extLst>
+      <p:ext uri="{BB962C8B-B14F-4D97-AF65-F5344CB8AC3E}">
+        <p14:creationId xmlns:p14="http://schemas.microsoft.com/office/powerpoint/2010/main" val="685413897"/>
+      </p:ext>
+    </p:extLst>
+  </p:cSld>
+  <p:clrMapOvr>
+    <a:masterClrMapping/>
+  </p:clrMapOvr>
+</p:sld>
+</file>
+
+<file path=ppt/slides/slide8.xml><?xml version="1.0" encoding="utf-8"?>
+<p:sld xmlns:a="http://schemas.openxmlformats.org/drawingml/2006/main" xmlns:r="http://schemas.openxmlformats.org/officeDocument/2006/relationships" xmlns:p="http://schemas.openxmlformats.org/presentationml/2006/main">
+  <p:cSld>
+    <p:spTree>
+      <p:nvGrpSpPr>
+        <p:cNvPr id="1" name=""/>
+        <p:cNvGrpSpPr/>
+        <p:nvPr/>
+      </p:nvGrpSpPr>
+      <p:grpSpPr>
+        <a:xfrm>
+          <a:off x="0" y="0"/>
+          <a:ext cx="0" cy="0"/>
+          <a:chOff x="0" y="0"/>
+          <a:chExt cx="0" cy="0"/>
+        </a:xfrm>
+      </p:grpSpPr>
+      <p:pic>
+        <p:nvPicPr>
+          <p:cNvPr id="4" name="図 3">
+            <a:extLst>
+              <a:ext uri="{FF2B5EF4-FFF2-40B4-BE49-F238E27FC236}">
+                <a16:creationId xmlns:a16="http://schemas.microsoft.com/office/drawing/2014/main" id="{76104B41-AB35-4CB0-811A-6C0FA176C133}"/>
+              </a:ext>
+            </a:extLst>
+          </p:cNvPr>
+          <p:cNvPicPr>
+            <a:picLocks noChangeAspect="1"/>
+          </p:cNvPicPr>
+          <p:nvPr/>
+        </p:nvPicPr>
+        <p:blipFill>
+          <a:blip r:embed="rId2"/>
+          <a:stretch>
+            <a:fillRect/>
+          </a:stretch>
+        </p:blipFill>
+        <p:spPr>
+          <a:xfrm>
+            <a:off x="423862" y="461962"/>
+            <a:ext cx="5191125" cy="1609725"/>
+          </a:xfrm>
+          <a:prstGeom prst="rect">
+            <a:avLst/>
+          </a:prstGeom>
+        </p:spPr>
+      </p:pic>
+      <p:sp>
+        <p:nvSpPr>
+          <p:cNvPr id="5" name="テキスト ボックス 4">
+            <a:extLst>
+              <a:ext uri="{FF2B5EF4-FFF2-40B4-BE49-F238E27FC236}">
+                <a16:creationId xmlns:a16="http://schemas.microsoft.com/office/drawing/2014/main" id="{3B9124B6-D8EA-4133-8E31-E09C3D7AFCDA}"/>
+              </a:ext>
+            </a:extLst>
+          </p:cNvPr>
+          <p:cNvSpPr txBox="1"/>
+          <p:nvPr/>
+        </p:nvSpPr>
+        <p:spPr>
+          <a:xfrm>
+            <a:off x="423862" y="92630"/>
+            <a:ext cx="976101" cy="369332"/>
+          </a:xfrm>
+          <a:prstGeom prst="rect">
+            <a:avLst/>
+          </a:prstGeom>
+          <a:noFill/>
+        </p:spPr>
+        <p:txBody>
+          <a:bodyPr wrap="none" rtlCol="0">
+            <a:spAutoFit/>
+          </a:bodyPr>
+          <a:lstStyle/>
+          <a:p>
+            <a:r>
+              <a:rPr lang="en-US" dirty="0">
+                <a:latin typeface="Calibri" panose="020F0502020204030204" pitchFamily="34" charset="0"/>
+                <a:cs typeface="Calibri" panose="020F0502020204030204" pitchFamily="34" charset="0"/>
+              </a:rPr>
+              <a:t>2,3 Page</a:t>
+            </a:r>
+          </a:p>
+        </p:txBody>
+      </p:sp>
+      <p:cxnSp>
+        <p:nvCxnSpPr>
+          <p:cNvPr id="8" name="直線コネクタ 7">
+            <a:extLst>
+              <a:ext uri="{FF2B5EF4-FFF2-40B4-BE49-F238E27FC236}">
+                <a16:creationId xmlns:a16="http://schemas.microsoft.com/office/drawing/2014/main" id="{74BC3752-6F1A-4FAC-928A-A6BA17154390}"/>
+              </a:ext>
+            </a:extLst>
+          </p:cNvPr>
+          <p:cNvCxnSpPr/>
+          <p:nvPr/>
+        </p:nvCxnSpPr>
+        <p:spPr>
+          <a:xfrm>
+            <a:off x="1790700" y="1695450"/>
+            <a:ext cx="2295525" cy="0"/>
+          </a:xfrm>
+          <a:prstGeom prst="line">
+            <a:avLst/>
+          </a:prstGeom>
+          <a:ln w="28575">
+            <a:solidFill>
+              <a:srgbClr val="FF0000"/>
+            </a:solidFill>
+          </a:ln>
+        </p:spPr>
+        <p:style>
+          <a:lnRef idx="1">
+            <a:schemeClr val="accent1"/>
+          </a:lnRef>
+          <a:fillRef idx="0">
+            <a:schemeClr val="accent1"/>
+          </a:fillRef>
+          <a:effectRef idx="0">
+            <a:schemeClr val="accent1"/>
+          </a:effectRef>
+          <a:fontRef idx="minor">
+            <a:schemeClr val="tx1"/>
+          </a:fontRef>
+        </p:style>
+      </p:cxnSp>
+      <p:cxnSp>
+        <p:nvCxnSpPr>
+          <p:cNvPr id="9" name="直線コネクタ 8">
+            <a:extLst>
+              <a:ext uri="{FF2B5EF4-FFF2-40B4-BE49-F238E27FC236}">
+                <a16:creationId xmlns:a16="http://schemas.microsoft.com/office/drawing/2014/main" id="{5615716D-366B-4425-9324-AD7C682F8737}"/>
+              </a:ext>
+            </a:extLst>
+          </p:cNvPr>
+          <p:cNvCxnSpPr>
+            <a:cxnSpLocks/>
+          </p:cNvCxnSpPr>
+          <p:nvPr/>
+        </p:nvCxnSpPr>
+        <p:spPr>
+          <a:xfrm>
+            <a:off x="433387" y="666750"/>
+            <a:ext cx="871538" cy="0"/>
+          </a:xfrm>
+          <a:prstGeom prst="line">
+            <a:avLst/>
+          </a:prstGeom>
+          <a:ln w="28575">
+            <a:solidFill>
+              <a:srgbClr val="FF0000"/>
+            </a:solidFill>
+          </a:ln>
+        </p:spPr>
+        <p:style>
+          <a:lnRef idx="1">
+            <a:schemeClr val="accent1"/>
+          </a:lnRef>
+          <a:fillRef idx="0">
+            <a:schemeClr val="accent1"/>
+          </a:fillRef>
+          <a:effectRef idx="0">
+            <a:schemeClr val="accent1"/>
+          </a:effectRef>
+          <a:fontRef idx="minor">
+            <a:schemeClr val="tx1"/>
+          </a:fontRef>
+        </p:style>
+      </p:cxnSp>
+      <p:cxnSp>
+        <p:nvCxnSpPr>
+          <p:cNvPr id="11" name="直線コネクタ 10">
+            <a:extLst>
+              <a:ext uri="{FF2B5EF4-FFF2-40B4-BE49-F238E27FC236}">
+                <a16:creationId xmlns:a16="http://schemas.microsoft.com/office/drawing/2014/main" id="{8BAAA92F-DFA0-45AD-872E-F6B42F0F86D8}"/>
+              </a:ext>
+            </a:extLst>
+          </p:cNvPr>
+          <p:cNvCxnSpPr>
+            <a:cxnSpLocks/>
+          </p:cNvCxnSpPr>
+          <p:nvPr/>
+        </p:nvCxnSpPr>
+        <p:spPr>
+          <a:xfrm>
+            <a:off x="3593306" y="781050"/>
+            <a:ext cx="1073944" cy="0"/>
+          </a:xfrm>
+          <a:prstGeom prst="line">
+            <a:avLst/>
+          </a:prstGeom>
+          <a:ln w="28575">
+            <a:solidFill>
+              <a:srgbClr val="FF0000"/>
+            </a:solidFill>
+          </a:ln>
+        </p:spPr>
+        <p:style>
+          <a:lnRef idx="1">
+            <a:schemeClr val="accent1"/>
+          </a:lnRef>
+          <a:fillRef idx="0">
+            <a:schemeClr val="accent1"/>
+          </a:fillRef>
+          <a:effectRef idx="0">
+            <a:schemeClr val="accent1"/>
+          </a:effectRef>
+          <a:fontRef idx="minor">
+            <a:schemeClr val="tx1"/>
+          </a:fontRef>
+        </p:style>
+      </p:cxnSp>
+      <p:pic>
+        <p:nvPicPr>
+          <p:cNvPr id="13" name="図 12">
+            <a:extLst>
+              <a:ext uri="{FF2B5EF4-FFF2-40B4-BE49-F238E27FC236}">
+                <a16:creationId xmlns:a16="http://schemas.microsoft.com/office/drawing/2014/main" id="{27A8213F-DCB5-4348-95B7-8BE0C75F25C5}"/>
+              </a:ext>
+            </a:extLst>
+          </p:cNvPr>
+          <p:cNvPicPr>
+            <a:picLocks noChangeAspect="1"/>
+          </p:cNvPicPr>
+          <p:nvPr/>
+        </p:nvPicPr>
+        <p:blipFill>
+          <a:blip r:embed="rId3"/>
+          <a:stretch>
+            <a:fillRect/>
+          </a:stretch>
+        </p:blipFill>
+        <p:spPr>
+          <a:xfrm>
+            <a:off x="450718" y="2219325"/>
+            <a:ext cx="6285175" cy="3662354"/>
+          </a:xfrm>
+          <a:prstGeom prst="rect">
+            <a:avLst/>
+          </a:prstGeom>
+        </p:spPr>
+      </p:pic>
+      <p:sp>
+        <p:nvSpPr>
+          <p:cNvPr id="14" name="正方形/長方形 13">
+            <a:extLst>
+              <a:ext uri="{FF2B5EF4-FFF2-40B4-BE49-F238E27FC236}">
+                <a16:creationId xmlns:a16="http://schemas.microsoft.com/office/drawing/2014/main" id="{75AFAA3E-ADE0-4855-A661-77A70726A8ED}"/>
+              </a:ext>
+            </a:extLst>
+          </p:cNvPr>
+          <p:cNvSpPr/>
+          <p:nvPr/>
+        </p:nvSpPr>
+        <p:spPr>
+          <a:xfrm>
+            <a:off x="1790700" y="5181600"/>
+            <a:ext cx="5038725" cy="361950"/>
+          </a:xfrm>
+          <a:prstGeom prst="rect">
+            <a:avLst/>
+          </a:prstGeom>
+          <a:noFill/>
+          <a:ln w="25400">
+            <a:solidFill>
+              <a:srgbClr val="FF0000"/>
+            </a:solidFill>
+          </a:ln>
+        </p:spPr>
+        <p:style>
+          <a:lnRef idx="2">
+            <a:schemeClr val="accent1">
+              <a:shade val="50000"/>
+            </a:schemeClr>
+          </a:lnRef>
+          <a:fillRef idx="1">
+            <a:schemeClr val="accent1"/>
+          </a:fillRef>
+          <a:effectRef idx="0">
+            <a:schemeClr val="accent1"/>
+          </a:effectRef>
+          <a:fontRef idx="minor">
+            <a:schemeClr val="lt1"/>
+          </a:fontRef>
+        </p:style>
+        <p:txBody>
+          <a:bodyPr rtlCol="0" anchor="ctr"/>
+          <a:lstStyle/>
+          <a:p>
+            <a:pPr algn="ctr"/>
+            <a:endParaRPr lang="en-US"/>
+          </a:p>
+        </p:txBody>
+      </p:sp>
+    </p:spTree>
+    <p:extLst>
+      <p:ext uri="{BB962C8B-B14F-4D97-AF65-F5344CB8AC3E}">
+        <p14:creationId xmlns:p14="http://schemas.microsoft.com/office/powerpoint/2010/main" val="3064912749"/>
+      </p:ext>
+    </p:extLst>
+  </p:cSld>
+  <p:clrMapOvr>
+    <a:masterClrMapping/>
+  </p:clrMapOvr>
+</p:sld>
+</file>
+
+<file path=ppt/slides/slide9.xml><?xml version="1.0" encoding="utf-8"?>
+<p:sld xmlns:a="http://schemas.openxmlformats.org/drawingml/2006/main" xmlns:r="http://schemas.openxmlformats.org/officeDocument/2006/relationships" xmlns:p="http://schemas.openxmlformats.org/presentationml/2006/main">
+  <p:cSld>
+    <p:spTree>
+      <p:nvGrpSpPr>
+        <p:cNvPr id="1" name=""/>
+        <p:cNvGrpSpPr/>
+        <p:nvPr/>
+      </p:nvGrpSpPr>
+      <p:grpSpPr>
+        <a:xfrm>
+          <a:off x="0" y="0"/>
+          <a:ext cx="0" cy="0"/>
+          <a:chOff x="0" y="0"/>
+          <a:chExt cx="0" cy="0"/>
+        </a:xfrm>
+      </p:grpSpPr>
+      <p:pic>
+        <p:nvPicPr>
+          <p:cNvPr id="4" name="図 3">
+            <a:extLst>
+              <a:ext uri="{FF2B5EF4-FFF2-40B4-BE49-F238E27FC236}">
+                <a16:creationId xmlns:a16="http://schemas.microsoft.com/office/drawing/2014/main" id="{59F3F3A9-B80A-4638-99A4-E176201F37DF}"/>
+              </a:ext>
+            </a:extLst>
+          </p:cNvPr>
+          <p:cNvPicPr>
+            <a:picLocks noChangeAspect="1"/>
+          </p:cNvPicPr>
+          <p:nvPr/>
+        </p:nvPicPr>
+        <p:blipFill>
+          <a:blip r:embed="rId2"/>
+          <a:stretch>
+            <a:fillRect/>
+          </a:stretch>
+        </p:blipFill>
+        <p:spPr>
+          <a:xfrm>
+            <a:off x="752475" y="1038225"/>
+            <a:ext cx="10687050" cy="4781550"/>
+          </a:xfrm>
+          <a:prstGeom prst="rect">
+            <a:avLst/>
+          </a:prstGeom>
+        </p:spPr>
+      </p:pic>
+      <p:sp>
+        <p:nvSpPr>
+          <p:cNvPr id="5" name="正方形/長方形 4">
+            <a:extLst>
+              <a:ext uri="{FF2B5EF4-FFF2-40B4-BE49-F238E27FC236}">
+                <a16:creationId xmlns:a16="http://schemas.microsoft.com/office/drawing/2014/main" id="{55768233-40C9-4084-80BA-44E960DC5836}"/>
+              </a:ext>
+            </a:extLst>
+          </p:cNvPr>
+          <p:cNvSpPr/>
+          <p:nvPr/>
+        </p:nvSpPr>
+        <p:spPr>
+          <a:xfrm>
+            <a:off x="962024" y="2758603"/>
+            <a:ext cx="1409701" cy="260822"/>
+          </a:xfrm>
+          <a:prstGeom prst="rect">
+            <a:avLst/>
+          </a:prstGeom>
+          <a:noFill/>
+          <a:ln w="25400">
+            <a:solidFill>
+              <a:srgbClr val="FF0000"/>
+            </a:solidFill>
+          </a:ln>
+        </p:spPr>
+        <p:style>
+          <a:lnRef idx="2">
+            <a:schemeClr val="accent1">
+              <a:shade val="50000"/>
+            </a:schemeClr>
+          </a:lnRef>
+          <a:fillRef idx="1">
+            <a:schemeClr val="accent1"/>
+          </a:fillRef>
+          <a:effectRef idx="0">
+            <a:schemeClr val="accent1"/>
+          </a:effectRef>
+          <a:fontRef idx="minor">
+            <a:schemeClr val="lt1"/>
+          </a:fontRef>
+        </p:style>
+        <p:txBody>
+          <a:bodyPr rtlCol="0" anchor="ctr"/>
+          <a:lstStyle/>
+          <a:p>
+            <a:pPr algn="ctr"/>
+            <a:endParaRPr lang="en-US"/>
+          </a:p>
+        </p:txBody>
+      </p:sp>
+      <p:sp>
+        <p:nvSpPr>
+          <p:cNvPr id="6" name="正方形/長方形 5">
+            <a:extLst>
+              <a:ext uri="{FF2B5EF4-FFF2-40B4-BE49-F238E27FC236}">
+                <a16:creationId xmlns:a16="http://schemas.microsoft.com/office/drawing/2014/main" id="{B0E12099-8672-4F3A-AFF6-FEA61181197E}"/>
+              </a:ext>
+            </a:extLst>
+          </p:cNvPr>
+          <p:cNvSpPr/>
+          <p:nvPr/>
+        </p:nvSpPr>
+        <p:spPr>
+          <a:xfrm>
+            <a:off x="4181474" y="2329978"/>
+            <a:ext cx="3657601" cy="317972"/>
+          </a:xfrm>
+          <a:prstGeom prst="rect">
+            <a:avLst/>
+          </a:prstGeom>
+          <a:noFill/>
+          <a:ln w="25400">
+            <a:solidFill>
+              <a:srgbClr val="FF0000"/>
+            </a:solidFill>
+          </a:ln>
+        </p:spPr>
+        <p:style>
+          <a:lnRef idx="2">
+            <a:schemeClr val="accent1">
+              <a:shade val="50000"/>
+            </a:schemeClr>
+          </a:lnRef>
+          <a:fillRef idx="1">
+            <a:schemeClr val="accent1"/>
+          </a:fillRef>
+          <a:effectRef idx="0">
+            <a:schemeClr val="accent1"/>
+          </a:effectRef>
+          <a:fontRef idx="minor">
+            <a:schemeClr val="lt1"/>
+          </a:fontRef>
+        </p:style>
+        <p:txBody>
+          <a:bodyPr rtlCol="0" anchor="ctr"/>
+          <a:lstStyle/>
+          <a:p>
+            <a:pPr algn="ctr"/>
+            <a:endParaRPr lang="en-US"/>
+          </a:p>
+        </p:txBody>
+      </p:sp>
+      <p:sp>
+        <p:nvSpPr>
+          <p:cNvPr id="7" name="正方形/長方形 6">
+            <a:extLst>
+              <a:ext uri="{FF2B5EF4-FFF2-40B4-BE49-F238E27FC236}">
+                <a16:creationId xmlns:a16="http://schemas.microsoft.com/office/drawing/2014/main" id="{09CC9266-C61C-4EA8-8A83-0632A2276244}"/>
+              </a:ext>
+            </a:extLst>
+          </p:cNvPr>
+          <p:cNvSpPr/>
+          <p:nvPr/>
+        </p:nvSpPr>
+        <p:spPr>
+          <a:xfrm>
+            <a:off x="4352925" y="4654078"/>
+            <a:ext cx="1933576" cy="222722"/>
+          </a:xfrm>
+          <a:prstGeom prst="rect">
+            <a:avLst/>
+          </a:prstGeom>
+          <a:noFill/>
+          <a:ln w="25400">
+            <a:solidFill>
+              <a:srgbClr val="FF0000"/>
+            </a:solidFill>
+          </a:ln>
+        </p:spPr>
+        <p:style>
+          <a:lnRef idx="2">
+            <a:schemeClr val="accent1">
+              <a:shade val="50000"/>
+            </a:schemeClr>
+          </a:lnRef>
+          <a:fillRef idx="1">
+            <a:schemeClr val="accent1"/>
+          </a:fillRef>
+          <a:effectRef idx="0">
+            <a:schemeClr val="accent1"/>
+          </a:effectRef>
+          <a:fontRef idx="minor">
+            <a:schemeClr val="lt1"/>
+          </a:fontRef>
+        </p:style>
+        <p:txBody>
+          <a:bodyPr rtlCol="0" anchor="ctr"/>
+          <a:lstStyle/>
+          <a:p>
+            <a:pPr algn="ctr"/>
+            <a:endParaRPr lang="en-US"/>
+          </a:p>
+        </p:txBody>
+      </p:sp>
+      <p:sp>
+        <p:nvSpPr>
+          <p:cNvPr id="8" name="正方形/長方形 7">
+            <a:extLst>
+              <a:ext uri="{FF2B5EF4-FFF2-40B4-BE49-F238E27FC236}">
+                <a16:creationId xmlns:a16="http://schemas.microsoft.com/office/drawing/2014/main" id="{333E2FB7-F36B-4925-971F-227328E9AAB1}"/>
+              </a:ext>
+            </a:extLst>
+          </p:cNvPr>
+          <p:cNvSpPr/>
+          <p:nvPr/>
+        </p:nvSpPr>
+        <p:spPr>
+          <a:xfrm>
+            <a:off x="8143876" y="3825402"/>
+            <a:ext cx="2667000" cy="232247"/>
+          </a:xfrm>
+          <a:prstGeom prst="rect">
+            <a:avLst/>
+          </a:prstGeom>
+          <a:noFill/>
+          <a:ln w="25400">
+            <a:solidFill>
+              <a:srgbClr val="FF0000"/>
+            </a:solidFill>
+          </a:ln>
+        </p:spPr>
+        <p:style>
+          <a:lnRef idx="2">
+            <a:schemeClr val="accent1">
+              <a:shade val="50000"/>
+            </a:schemeClr>
+          </a:lnRef>
+          <a:fillRef idx="1">
+            <a:schemeClr val="accent1"/>
+          </a:fillRef>
+          <a:effectRef idx="0">
+            <a:schemeClr val="accent1"/>
+          </a:effectRef>
+          <a:fontRef idx="minor">
+            <a:schemeClr val="lt1"/>
+          </a:fontRef>
+        </p:style>
+        <p:txBody>
+          <a:bodyPr rtlCol="0" anchor="ctr"/>
+          <a:lstStyle/>
+          <a:p>
+            <a:pPr algn="ctr"/>
+            <a:endParaRPr lang="en-US"/>
+          </a:p>
+        </p:txBody>
+      </p:sp>
+      <p:cxnSp>
+        <p:nvCxnSpPr>
+          <p:cNvPr id="9" name="コネクタ: 曲線 8">
+            <a:extLst>
+              <a:ext uri="{FF2B5EF4-FFF2-40B4-BE49-F238E27FC236}">
+                <a16:creationId xmlns:a16="http://schemas.microsoft.com/office/drawing/2014/main" id="{4B2B9D24-C2A9-47D8-A298-D6BBC3D299F2}"/>
+              </a:ext>
+            </a:extLst>
+          </p:cNvPr>
+          <p:cNvCxnSpPr>
+            <a:cxnSpLocks/>
+            <a:stCxn id="5" idx="3"/>
+            <a:endCxn id="6" idx="1"/>
+          </p:cNvCxnSpPr>
+          <p:nvPr/>
+        </p:nvCxnSpPr>
+        <p:spPr>
+          <a:xfrm flipV="1">
+            <a:off x="2371725" y="2488964"/>
+            <a:ext cx="1809749" cy="400050"/>
+          </a:xfrm>
+          <a:prstGeom prst="curvedConnector3">
+            <a:avLst>
+              <a:gd name="adj1" fmla="val 50000"/>
+            </a:avLst>
+          </a:prstGeom>
+          <a:ln w="19050">
+            <a:solidFill>
+              <a:srgbClr val="FF0000"/>
+            </a:solidFill>
+            <a:prstDash val="sysDash"/>
+            <a:tailEnd type="triangle"/>
+          </a:ln>
+        </p:spPr>
+        <p:style>
+          <a:lnRef idx="1">
+            <a:schemeClr val="accent1"/>
+          </a:lnRef>
+          <a:fillRef idx="0">
+            <a:schemeClr val="accent1"/>
+          </a:fillRef>
+          <a:effectRef idx="0">
+            <a:schemeClr val="accent1"/>
+          </a:effectRef>
+          <a:fontRef idx="minor">
+            <a:schemeClr val="tx1"/>
+          </a:fontRef>
+        </p:style>
+      </p:cxnSp>
+      <p:cxnSp>
+        <p:nvCxnSpPr>
+          <p:cNvPr id="12" name="コネクタ: 曲線 11">
+            <a:extLst>
+              <a:ext uri="{FF2B5EF4-FFF2-40B4-BE49-F238E27FC236}">
+                <a16:creationId xmlns:a16="http://schemas.microsoft.com/office/drawing/2014/main" id="{32EC7779-3915-461A-9E64-163669ED707F}"/>
+              </a:ext>
+            </a:extLst>
+          </p:cNvPr>
+          <p:cNvCxnSpPr>
+            <a:cxnSpLocks/>
+            <a:stCxn id="6" idx="2"/>
+            <a:endCxn id="7" idx="0"/>
+          </p:cNvCxnSpPr>
+          <p:nvPr/>
+        </p:nvCxnSpPr>
+        <p:spPr>
+          <a:xfrm rot="5400000">
+            <a:off x="4661930" y="3305733"/>
+            <a:ext cx="2006128" cy="690562"/>
+          </a:xfrm>
+          <a:prstGeom prst="curvedConnector3">
+            <a:avLst>
+              <a:gd name="adj1" fmla="val 50000"/>
+            </a:avLst>
+          </a:prstGeom>
+          <a:ln w="19050">
+            <a:solidFill>
+              <a:srgbClr val="FF0000"/>
+            </a:solidFill>
+            <a:prstDash val="sysDash"/>
+            <a:tailEnd type="triangle"/>
+          </a:ln>
+        </p:spPr>
+        <p:style>
+          <a:lnRef idx="1">
+            <a:schemeClr val="accent1"/>
+          </a:lnRef>
+          <a:fillRef idx="0">
+            <a:schemeClr val="accent1"/>
+          </a:fillRef>
+          <a:effectRef idx="0">
+            <a:schemeClr val="accent1"/>
+          </a:effectRef>
+          <a:fontRef idx="minor">
+            <a:schemeClr val="tx1"/>
+          </a:fontRef>
+        </p:style>
+      </p:cxnSp>
+      <p:cxnSp>
+        <p:nvCxnSpPr>
+          <p:cNvPr id="15" name="コネクタ: 曲線 14">
+            <a:extLst>
+              <a:ext uri="{FF2B5EF4-FFF2-40B4-BE49-F238E27FC236}">
+                <a16:creationId xmlns:a16="http://schemas.microsoft.com/office/drawing/2014/main" id="{CC67824B-6365-4D51-9F28-C99F22C8812C}"/>
+              </a:ext>
+            </a:extLst>
+          </p:cNvPr>
+          <p:cNvCxnSpPr>
+            <a:cxnSpLocks/>
+            <a:stCxn id="7" idx="3"/>
+            <a:endCxn id="8" idx="1"/>
+          </p:cNvCxnSpPr>
+          <p:nvPr/>
+        </p:nvCxnSpPr>
+        <p:spPr>
+          <a:xfrm flipV="1">
+            <a:off x="6286501" y="3941526"/>
+            <a:ext cx="1857375" cy="823913"/>
+          </a:xfrm>
+          <a:prstGeom prst="curvedConnector3">
+            <a:avLst>
+              <a:gd name="adj1" fmla="val 50000"/>
+            </a:avLst>
+          </a:prstGeom>
+          <a:ln w="19050">
+            <a:solidFill>
+              <a:srgbClr val="FF0000"/>
+            </a:solidFill>
+            <a:prstDash val="sysDash"/>
+            <a:tailEnd type="triangle"/>
+          </a:ln>
+        </p:spPr>
+        <p:style>
+          <a:lnRef idx="1">
+            <a:schemeClr val="accent1"/>
+          </a:lnRef>
+          <a:fillRef idx="0">
+            <a:schemeClr val="accent1"/>
+          </a:fillRef>
+          <a:effectRef idx="0">
+            <a:schemeClr val="accent1"/>
+          </a:effectRef>
+          <a:fontRef idx="minor">
+            <a:schemeClr val="tx1"/>
+          </a:fontRef>
+        </p:style>
+      </p:cxnSp>
+    </p:spTree>
+    <p:extLst>
+      <p:ext uri="{BB962C8B-B14F-4D97-AF65-F5344CB8AC3E}">
+        <p14:creationId xmlns:p14="http://schemas.microsoft.com/office/powerpoint/2010/main" val="3946380708"/>
+      </p:ext>
+    </p:extLst>
+  </p:cSld>
+  <p:clrMapOvr>
+    <a:masterClrMapping/>
+  </p:clrMapOvr>
+</p:sld>
+</file>
+
 <file path=ppt/theme/theme1.xml><?xml version="1.0" encoding="utf-8"?>
 <a:theme xmlns:a="http://schemas.openxmlformats.org/drawingml/2006/main" name="Office テーマ">
   <a:themeElements>

</xml_diff>

<commit_message>
[main] Update Part.1 overall.
</commit_message>
<xml_diff>
--- a/Resources/Part1/Part1_Resources.pptx
+++ b/Resources/Part1/Part1_Resources.pptx
@@ -15,6 +15,10 @@
     <p:sldId id="263" r:id="rId9"/>
     <p:sldId id="264" r:id="rId10"/>
     <p:sldId id="265" r:id="rId11"/>
+    <p:sldId id="266" r:id="rId12"/>
+    <p:sldId id="267" r:id="rId13"/>
+    <p:sldId id="268" r:id="rId14"/>
+    <p:sldId id="269" r:id="rId15"/>
   </p:sldIdLst>
   <p:sldSz cx="12192000" cy="6858000"/>
   <p:notesSz cx="6858000" cy="9144000"/>
@@ -13573,7 +13577,7 @@
           <a:p>
             <a:fld id="{1A086832-2622-4354-BD9D-64D40320B320}" type="datetimeFigureOut">
               <a:rPr kumimoji="1" lang="ja-JP" altLang="en-US" smtClean="0"/>
-              <a:t>2024/11/2</a:t>
+              <a:t>2024/11/3</a:t>
             </a:fld>
             <a:endParaRPr kumimoji="1" lang="ja-JP" altLang="en-US"/>
           </a:p>
@@ -13803,7 +13807,7 @@
           <a:p>
             <a:fld id="{1A086832-2622-4354-BD9D-64D40320B320}" type="datetimeFigureOut">
               <a:rPr kumimoji="1" lang="ja-JP" altLang="en-US" smtClean="0"/>
-              <a:t>2024/11/2</a:t>
+              <a:t>2024/11/3</a:t>
             </a:fld>
             <a:endParaRPr kumimoji="1" lang="ja-JP" altLang="en-US"/>
           </a:p>
@@ -14043,7 +14047,7 @@
           <a:p>
             <a:fld id="{1A086832-2622-4354-BD9D-64D40320B320}" type="datetimeFigureOut">
               <a:rPr kumimoji="1" lang="ja-JP" altLang="en-US" smtClean="0"/>
-              <a:t>2024/11/2</a:t>
+              <a:t>2024/11/3</a:t>
             </a:fld>
             <a:endParaRPr kumimoji="1" lang="ja-JP" altLang="en-US"/>
           </a:p>
@@ -14273,7 +14277,7 @@
           <a:p>
             <a:fld id="{1A086832-2622-4354-BD9D-64D40320B320}" type="datetimeFigureOut">
               <a:rPr kumimoji="1" lang="ja-JP" altLang="en-US" smtClean="0"/>
-              <a:t>2024/11/2</a:t>
+              <a:t>2024/11/3</a:t>
             </a:fld>
             <a:endParaRPr kumimoji="1" lang="ja-JP" altLang="en-US"/>
           </a:p>
@@ -14548,7 +14552,7 @@
           <a:p>
             <a:fld id="{1A086832-2622-4354-BD9D-64D40320B320}" type="datetimeFigureOut">
               <a:rPr kumimoji="1" lang="ja-JP" altLang="en-US" smtClean="0"/>
-              <a:t>2024/11/2</a:t>
+              <a:t>2024/11/3</a:t>
             </a:fld>
             <a:endParaRPr kumimoji="1" lang="ja-JP" altLang="en-US"/>
           </a:p>
@@ -14877,7 +14881,7 @@
           <a:p>
             <a:fld id="{1A086832-2622-4354-BD9D-64D40320B320}" type="datetimeFigureOut">
               <a:rPr kumimoji="1" lang="ja-JP" altLang="en-US" smtClean="0"/>
-              <a:t>2024/11/2</a:t>
+              <a:t>2024/11/3</a:t>
             </a:fld>
             <a:endParaRPr kumimoji="1" lang="ja-JP" altLang="en-US"/>
           </a:p>
@@ -15353,7 +15357,7 @@
           <a:p>
             <a:fld id="{1A086832-2622-4354-BD9D-64D40320B320}" type="datetimeFigureOut">
               <a:rPr kumimoji="1" lang="ja-JP" altLang="en-US" smtClean="0"/>
-              <a:t>2024/11/2</a:t>
+              <a:t>2024/11/3</a:t>
             </a:fld>
             <a:endParaRPr kumimoji="1" lang="ja-JP" altLang="en-US"/>
           </a:p>
@@ -15494,7 +15498,7 @@
           <a:p>
             <a:fld id="{1A086832-2622-4354-BD9D-64D40320B320}" type="datetimeFigureOut">
               <a:rPr kumimoji="1" lang="ja-JP" altLang="en-US" smtClean="0"/>
-              <a:t>2024/11/2</a:t>
+              <a:t>2024/11/3</a:t>
             </a:fld>
             <a:endParaRPr kumimoji="1" lang="ja-JP" altLang="en-US"/>
           </a:p>
@@ -15607,7 +15611,7 @@
           <a:p>
             <a:fld id="{1A086832-2622-4354-BD9D-64D40320B320}" type="datetimeFigureOut">
               <a:rPr kumimoji="1" lang="ja-JP" altLang="en-US" smtClean="0"/>
-              <a:t>2024/11/2</a:t>
+              <a:t>2024/11/3</a:t>
             </a:fld>
             <a:endParaRPr kumimoji="1" lang="ja-JP" altLang="en-US"/>
           </a:p>
@@ -15950,7 +15954,7 @@
           <a:p>
             <a:fld id="{1A086832-2622-4354-BD9D-64D40320B320}" type="datetimeFigureOut">
               <a:rPr kumimoji="1" lang="ja-JP" altLang="en-US" smtClean="0"/>
-              <a:t>2024/11/2</a:t>
+              <a:t>2024/11/3</a:t>
             </a:fld>
             <a:endParaRPr kumimoji="1" lang="ja-JP" altLang="en-US"/>
           </a:p>
@@ -16238,7 +16242,7 @@
           <a:p>
             <a:fld id="{1A086832-2622-4354-BD9D-64D40320B320}" type="datetimeFigureOut">
               <a:rPr kumimoji="1" lang="ja-JP" altLang="en-US" smtClean="0"/>
-              <a:t>2024/11/2</a:t>
+              <a:t>2024/11/3</a:t>
             </a:fld>
             <a:endParaRPr kumimoji="1" lang="ja-JP" altLang="en-US"/>
           </a:p>
@@ -16511,7 +16515,7 @@
           <a:p>
             <a:fld id="{1A086832-2622-4354-BD9D-64D40320B320}" type="datetimeFigureOut">
               <a:rPr kumimoji="1" lang="ja-JP" altLang="en-US" smtClean="0"/>
-              <a:t>2024/11/2</a:t>
+              <a:t>2024/11/3</a:t>
             </a:fld>
             <a:endParaRPr kumimoji="1" lang="ja-JP" altLang="en-US"/>
           </a:p>
@@ -18337,6 +18341,853 @@
     <p:extLst>
       <p:ext uri="{BB962C8B-B14F-4D97-AF65-F5344CB8AC3E}">
         <p14:creationId xmlns:p14="http://schemas.microsoft.com/office/powerpoint/2010/main" val="3256643030"/>
+      </p:ext>
+    </p:extLst>
+  </p:cSld>
+  <p:clrMapOvr>
+    <a:masterClrMapping/>
+  </p:clrMapOvr>
+</p:sld>
+</file>
+
+<file path=ppt/slides/slide11.xml><?xml version="1.0" encoding="utf-8"?>
+<p:sld xmlns:a="http://schemas.openxmlformats.org/drawingml/2006/main" xmlns:r="http://schemas.openxmlformats.org/officeDocument/2006/relationships" xmlns:p="http://schemas.openxmlformats.org/presentationml/2006/main">
+  <p:cSld>
+    <p:spTree>
+      <p:nvGrpSpPr>
+        <p:cNvPr id="1" name=""/>
+        <p:cNvGrpSpPr/>
+        <p:nvPr/>
+      </p:nvGrpSpPr>
+      <p:grpSpPr>
+        <a:xfrm>
+          <a:off x="0" y="0"/>
+          <a:ext cx="0" cy="0"/>
+          <a:chOff x="0" y="0"/>
+          <a:chExt cx="0" cy="0"/>
+        </a:xfrm>
+      </p:grpSpPr>
+      <p:pic>
+        <p:nvPicPr>
+          <p:cNvPr id="4" name="図 3">
+            <a:extLst>
+              <a:ext uri="{FF2B5EF4-FFF2-40B4-BE49-F238E27FC236}">
+                <a16:creationId xmlns:a16="http://schemas.microsoft.com/office/drawing/2014/main" id="{1E7FAB03-D48D-473B-B873-38BE93E12318}"/>
+              </a:ext>
+            </a:extLst>
+          </p:cNvPr>
+          <p:cNvPicPr>
+            <a:picLocks noChangeAspect="1"/>
+          </p:cNvPicPr>
+          <p:nvPr/>
+        </p:nvPicPr>
+        <p:blipFill>
+          <a:blip r:embed="rId2"/>
+          <a:stretch>
+            <a:fillRect/>
+          </a:stretch>
+        </p:blipFill>
+        <p:spPr>
+          <a:xfrm>
+            <a:off x="3733800" y="652462"/>
+            <a:ext cx="4724400" cy="5553075"/>
+          </a:xfrm>
+          <a:prstGeom prst="rect">
+            <a:avLst/>
+          </a:prstGeom>
+        </p:spPr>
+      </p:pic>
+      <p:sp>
+        <p:nvSpPr>
+          <p:cNvPr id="5" name="正方形/長方形 4">
+            <a:extLst>
+              <a:ext uri="{FF2B5EF4-FFF2-40B4-BE49-F238E27FC236}">
+                <a16:creationId xmlns:a16="http://schemas.microsoft.com/office/drawing/2014/main" id="{3E4997B6-F98C-41E3-BC77-5C13DC9D21ED}"/>
+              </a:ext>
+            </a:extLst>
+          </p:cNvPr>
+          <p:cNvSpPr/>
+          <p:nvPr/>
+        </p:nvSpPr>
+        <p:spPr>
+          <a:xfrm>
+            <a:off x="7280946" y="2348918"/>
+            <a:ext cx="277536" cy="318782"/>
+          </a:xfrm>
+          <a:prstGeom prst="rect">
+            <a:avLst/>
+          </a:prstGeom>
+          <a:noFill/>
+          <a:ln w="25400">
+            <a:solidFill>
+              <a:srgbClr val="FF0000"/>
+            </a:solidFill>
+          </a:ln>
+        </p:spPr>
+        <p:style>
+          <a:lnRef idx="2">
+            <a:schemeClr val="accent1">
+              <a:shade val="50000"/>
+            </a:schemeClr>
+          </a:lnRef>
+          <a:fillRef idx="1">
+            <a:schemeClr val="accent1"/>
+          </a:fillRef>
+          <a:effectRef idx="0">
+            <a:schemeClr val="accent1"/>
+          </a:effectRef>
+          <a:fontRef idx="minor">
+            <a:schemeClr val="lt1"/>
+          </a:fontRef>
+        </p:style>
+        <p:txBody>
+          <a:bodyPr rtlCol="0" anchor="ctr"/>
+          <a:lstStyle/>
+          <a:p>
+            <a:pPr algn="ctr"/>
+            <a:endParaRPr lang="en-US"/>
+          </a:p>
+        </p:txBody>
+      </p:sp>
+      <p:sp>
+        <p:nvSpPr>
+          <p:cNvPr id="8" name="テキスト ボックス 7">
+            <a:extLst>
+              <a:ext uri="{FF2B5EF4-FFF2-40B4-BE49-F238E27FC236}">
+                <a16:creationId xmlns:a16="http://schemas.microsoft.com/office/drawing/2014/main" id="{9FBD32E6-EF03-4FFF-9E75-526B6B97C2CF}"/>
+              </a:ext>
+            </a:extLst>
+          </p:cNvPr>
+          <p:cNvSpPr txBox="1"/>
+          <p:nvPr/>
+        </p:nvSpPr>
+        <p:spPr>
+          <a:xfrm>
+            <a:off x="8880179" y="2323643"/>
+            <a:ext cx="542136" cy="369332"/>
+          </a:xfrm>
+          <a:prstGeom prst="rect">
+            <a:avLst/>
+          </a:prstGeom>
+          <a:noFill/>
+        </p:spPr>
+        <p:txBody>
+          <a:bodyPr wrap="none" rtlCol="0">
+            <a:spAutoFit/>
+          </a:bodyPr>
+          <a:lstStyle/>
+          <a:p>
+            <a:r>
+              <a:rPr lang="en-US" dirty="0">
+                <a:latin typeface="Calibri" panose="020F0502020204030204" pitchFamily="34" charset="0"/>
+                <a:cs typeface="Calibri" panose="020F0502020204030204" pitchFamily="34" charset="0"/>
+              </a:rPr>
+              <a:t>LD4</a:t>
+            </a:r>
+          </a:p>
+        </p:txBody>
+      </p:sp>
+      <p:cxnSp>
+        <p:nvCxnSpPr>
+          <p:cNvPr id="12" name="直線矢印コネクタ 11">
+            <a:extLst>
+              <a:ext uri="{FF2B5EF4-FFF2-40B4-BE49-F238E27FC236}">
+                <a16:creationId xmlns:a16="http://schemas.microsoft.com/office/drawing/2014/main" id="{67E64D6C-2ED6-4D90-87DC-6AD1B610AA6D}"/>
+              </a:ext>
+            </a:extLst>
+          </p:cNvPr>
+          <p:cNvCxnSpPr>
+            <a:cxnSpLocks/>
+            <a:stCxn id="8" idx="1"/>
+            <a:endCxn id="5" idx="3"/>
+          </p:cNvCxnSpPr>
+          <p:nvPr/>
+        </p:nvCxnSpPr>
+        <p:spPr>
+          <a:xfrm flipH="1">
+            <a:off x="7558482" y="2508309"/>
+            <a:ext cx="1321697" cy="0"/>
+          </a:xfrm>
+          <a:prstGeom prst="straightConnector1">
+            <a:avLst/>
+          </a:prstGeom>
+          <a:ln>
+            <a:solidFill>
+              <a:srgbClr val="FF0000"/>
+            </a:solidFill>
+            <a:prstDash val="dash"/>
+            <a:tailEnd type="triangle"/>
+          </a:ln>
+        </p:spPr>
+        <p:style>
+          <a:lnRef idx="1">
+            <a:schemeClr val="accent1"/>
+          </a:lnRef>
+          <a:fillRef idx="0">
+            <a:schemeClr val="accent1"/>
+          </a:fillRef>
+          <a:effectRef idx="0">
+            <a:schemeClr val="accent1"/>
+          </a:effectRef>
+          <a:fontRef idx="minor">
+            <a:schemeClr val="tx1"/>
+          </a:fontRef>
+        </p:style>
+      </p:cxnSp>
+    </p:spTree>
+    <p:extLst>
+      <p:ext uri="{BB962C8B-B14F-4D97-AF65-F5344CB8AC3E}">
+        <p14:creationId xmlns:p14="http://schemas.microsoft.com/office/powerpoint/2010/main" val="3697869305"/>
+      </p:ext>
+    </p:extLst>
+  </p:cSld>
+  <p:clrMapOvr>
+    <a:masterClrMapping/>
+  </p:clrMapOvr>
+</p:sld>
+</file>
+
+<file path=ppt/slides/slide12.xml><?xml version="1.0" encoding="utf-8"?>
+<p:sld xmlns:a="http://schemas.openxmlformats.org/drawingml/2006/main" xmlns:r="http://schemas.openxmlformats.org/officeDocument/2006/relationships" xmlns:p="http://schemas.openxmlformats.org/presentationml/2006/main">
+  <p:cSld>
+    <p:spTree>
+      <p:nvGrpSpPr>
+        <p:cNvPr id="1" name=""/>
+        <p:cNvGrpSpPr/>
+        <p:nvPr/>
+      </p:nvGrpSpPr>
+      <p:grpSpPr>
+        <a:xfrm>
+          <a:off x="0" y="0"/>
+          <a:ext cx="0" cy="0"/>
+          <a:chOff x="0" y="0"/>
+          <a:chExt cx="0" cy="0"/>
+        </a:xfrm>
+      </p:grpSpPr>
+      <p:pic>
+        <p:nvPicPr>
+          <p:cNvPr id="4" name="図 3">
+            <a:extLst>
+              <a:ext uri="{FF2B5EF4-FFF2-40B4-BE49-F238E27FC236}">
+                <a16:creationId xmlns:a16="http://schemas.microsoft.com/office/drawing/2014/main" id="{56E7AD53-EA96-47C2-94A3-E8A1576F3A41}"/>
+              </a:ext>
+            </a:extLst>
+          </p:cNvPr>
+          <p:cNvPicPr>
+            <a:picLocks noChangeAspect="1"/>
+          </p:cNvPicPr>
+          <p:nvPr/>
+        </p:nvPicPr>
+        <p:blipFill>
+          <a:blip r:embed="rId2"/>
+          <a:stretch>
+            <a:fillRect/>
+          </a:stretch>
+        </p:blipFill>
+        <p:spPr>
+          <a:xfrm>
+            <a:off x="3033712" y="1490662"/>
+            <a:ext cx="6124575" cy="3876675"/>
+          </a:xfrm>
+          <a:prstGeom prst="rect">
+            <a:avLst/>
+          </a:prstGeom>
+        </p:spPr>
+      </p:pic>
+      <p:sp>
+        <p:nvSpPr>
+          <p:cNvPr id="5" name="テキスト ボックス 4">
+            <a:extLst>
+              <a:ext uri="{FF2B5EF4-FFF2-40B4-BE49-F238E27FC236}">
+                <a16:creationId xmlns:a16="http://schemas.microsoft.com/office/drawing/2014/main" id="{2811E029-B8B5-4CD1-A5DA-97C174581117}"/>
+              </a:ext>
+            </a:extLst>
+          </p:cNvPr>
+          <p:cNvSpPr txBox="1"/>
+          <p:nvPr/>
+        </p:nvSpPr>
+        <p:spPr>
+          <a:xfrm>
+            <a:off x="3033712" y="1121330"/>
+            <a:ext cx="801373" cy="369332"/>
+          </a:xfrm>
+          <a:prstGeom prst="rect">
+            <a:avLst/>
+          </a:prstGeom>
+          <a:noFill/>
+        </p:spPr>
+        <p:txBody>
+          <a:bodyPr wrap="none" rtlCol="0">
+            <a:spAutoFit/>
+          </a:bodyPr>
+          <a:lstStyle/>
+          <a:p>
+            <a:r>
+              <a:rPr lang="en-US" dirty="0">
+                <a:latin typeface="Calibri" panose="020F0502020204030204" pitchFamily="34" charset="0"/>
+                <a:cs typeface="Calibri" panose="020F0502020204030204" pitchFamily="34" charset="0"/>
+              </a:rPr>
+              <a:t>5 Page</a:t>
+            </a:r>
+          </a:p>
+        </p:txBody>
+      </p:sp>
+    </p:spTree>
+    <p:extLst>
+      <p:ext uri="{BB962C8B-B14F-4D97-AF65-F5344CB8AC3E}">
+        <p14:creationId xmlns:p14="http://schemas.microsoft.com/office/powerpoint/2010/main" val="922243165"/>
+      </p:ext>
+    </p:extLst>
+  </p:cSld>
+  <p:clrMapOvr>
+    <a:masterClrMapping/>
+  </p:clrMapOvr>
+</p:sld>
+</file>
+
+<file path=ppt/slides/slide13.xml><?xml version="1.0" encoding="utf-8"?>
+<p:sld xmlns:a="http://schemas.openxmlformats.org/drawingml/2006/main" xmlns:r="http://schemas.openxmlformats.org/officeDocument/2006/relationships" xmlns:p="http://schemas.openxmlformats.org/presentationml/2006/main">
+  <p:cSld>
+    <p:spTree>
+      <p:nvGrpSpPr>
+        <p:cNvPr id="1" name=""/>
+        <p:cNvGrpSpPr/>
+        <p:nvPr/>
+      </p:nvGrpSpPr>
+      <p:grpSpPr>
+        <a:xfrm>
+          <a:off x="0" y="0"/>
+          <a:ext cx="0" cy="0"/>
+          <a:chOff x="0" y="0"/>
+          <a:chExt cx="0" cy="0"/>
+        </a:xfrm>
+      </p:grpSpPr>
+      <p:pic>
+        <p:nvPicPr>
+          <p:cNvPr id="4" name="図 3">
+            <a:extLst>
+              <a:ext uri="{FF2B5EF4-FFF2-40B4-BE49-F238E27FC236}">
+                <a16:creationId xmlns:a16="http://schemas.microsoft.com/office/drawing/2014/main" id="{70A61A42-014E-4D32-96C2-217049CA6EE9}"/>
+              </a:ext>
+            </a:extLst>
+          </p:cNvPr>
+          <p:cNvPicPr>
+            <a:picLocks noChangeAspect="1"/>
+          </p:cNvPicPr>
+          <p:nvPr/>
+        </p:nvPicPr>
+        <p:blipFill>
+          <a:blip r:embed="rId2"/>
+          <a:stretch>
+            <a:fillRect/>
+          </a:stretch>
+        </p:blipFill>
+        <p:spPr>
+          <a:xfrm>
+            <a:off x="1800225" y="257175"/>
+            <a:ext cx="8591550" cy="6343650"/>
+          </a:xfrm>
+          <a:prstGeom prst="rect">
+            <a:avLst/>
+          </a:prstGeom>
+        </p:spPr>
+      </p:pic>
+      <p:sp>
+        <p:nvSpPr>
+          <p:cNvPr id="5" name="正方形/長方形 4">
+            <a:extLst>
+              <a:ext uri="{FF2B5EF4-FFF2-40B4-BE49-F238E27FC236}">
+                <a16:creationId xmlns:a16="http://schemas.microsoft.com/office/drawing/2014/main" id="{175594B0-DCE7-4B9F-8B7A-40B6C5C5B5B1}"/>
+              </a:ext>
+            </a:extLst>
+          </p:cNvPr>
+          <p:cNvSpPr/>
+          <p:nvPr/>
+        </p:nvSpPr>
+        <p:spPr>
+          <a:xfrm flipV="1">
+            <a:off x="7029974" y="2776756"/>
+            <a:ext cx="1098958" cy="3254928"/>
+          </a:xfrm>
+          <a:prstGeom prst="rect">
+            <a:avLst/>
+          </a:prstGeom>
+          <a:noFill/>
+          <a:ln w="25400">
+            <a:solidFill>
+              <a:srgbClr val="FF0000"/>
+            </a:solidFill>
+          </a:ln>
+        </p:spPr>
+        <p:style>
+          <a:lnRef idx="2">
+            <a:schemeClr val="accent1">
+              <a:shade val="50000"/>
+            </a:schemeClr>
+          </a:lnRef>
+          <a:fillRef idx="1">
+            <a:schemeClr val="accent1"/>
+          </a:fillRef>
+          <a:effectRef idx="0">
+            <a:schemeClr val="accent1"/>
+          </a:effectRef>
+          <a:fontRef idx="minor">
+            <a:schemeClr val="lt1"/>
+          </a:fontRef>
+        </p:style>
+        <p:txBody>
+          <a:bodyPr rtlCol="0" anchor="ctr"/>
+          <a:lstStyle/>
+          <a:p>
+            <a:pPr algn="ctr"/>
+            <a:endParaRPr lang="en-US"/>
+          </a:p>
+        </p:txBody>
+      </p:sp>
+      <p:cxnSp>
+        <p:nvCxnSpPr>
+          <p:cNvPr id="6" name="直線コネクタ 5">
+            <a:extLst>
+              <a:ext uri="{FF2B5EF4-FFF2-40B4-BE49-F238E27FC236}">
+                <a16:creationId xmlns:a16="http://schemas.microsoft.com/office/drawing/2014/main" id="{E0826A50-A570-4202-9F45-8FDCA00EF12E}"/>
+              </a:ext>
+            </a:extLst>
+          </p:cNvPr>
+          <p:cNvCxnSpPr>
+            <a:cxnSpLocks/>
+          </p:cNvCxnSpPr>
+          <p:nvPr/>
+        </p:nvCxnSpPr>
+        <p:spPr>
+          <a:xfrm>
+            <a:off x="7148294" y="4309845"/>
+            <a:ext cx="712190" cy="0"/>
+          </a:xfrm>
+          <a:prstGeom prst="line">
+            <a:avLst/>
+          </a:prstGeom>
+          <a:ln w="28575">
+            <a:solidFill>
+              <a:srgbClr val="FF0000"/>
+            </a:solidFill>
+          </a:ln>
+        </p:spPr>
+        <p:style>
+          <a:lnRef idx="1">
+            <a:schemeClr val="accent1"/>
+          </a:lnRef>
+          <a:fillRef idx="0">
+            <a:schemeClr val="accent1"/>
+          </a:fillRef>
+          <a:effectRef idx="0">
+            <a:schemeClr val="accent1"/>
+          </a:effectRef>
+          <a:fontRef idx="minor">
+            <a:schemeClr val="tx1"/>
+          </a:fontRef>
+        </p:style>
+      </p:cxnSp>
+      <p:cxnSp>
+        <p:nvCxnSpPr>
+          <p:cNvPr id="8" name="直線コネクタ 7">
+            <a:extLst>
+              <a:ext uri="{FF2B5EF4-FFF2-40B4-BE49-F238E27FC236}">
+                <a16:creationId xmlns:a16="http://schemas.microsoft.com/office/drawing/2014/main" id="{2D71944A-DDEE-4498-9378-4A45EF1578CD}"/>
+              </a:ext>
+            </a:extLst>
+          </p:cNvPr>
+          <p:cNvCxnSpPr>
+            <a:cxnSpLocks/>
+          </p:cNvCxnSpPr>
+          <p:nvPr/>
+        </p:nvCxnSpPr>
+        <p:spPr>
+          <a:xfrm>
+            <a:off x="7158081" y="4487412"/>
+            <a:ext cx="712190" cy="0"/>
+          </a:xfrm>
+          <a:prstGeom prst="line">
+            <a:avLst/>
+          </a:prstGeom>
+          <a:ln w="28575">
+            <a:solidFill>
+              <a:srgbClr val="FF0000"/>
+            </a:solidFill>
+          </a:ln>
+        </p:spPr>
+        <p:style>
+          <a:lnRef idx="1">
+            <a:schemeClr val="accent1"/>
+          </a:lnRef>
+          <a:fillRef idx="0">
+            <a:schemeClr val="accent1"/>
+          </a:fillRef>
+          <a:effectRef idx="0">
+            <a:schemeClr val="accent1"/>
+          </a:effectRef>
+          <a:fontRef idx="minor">
+            <a:schemeClr val="tx1"/>
+          </a:fontRef>
+        </p:style>
+      </p:cxnSp>
+    </p:spTree>
+    <p:extLst>
+      <p:ext uri="{BB962C8B-B14F-4D97-AF65-F5344CB8AC3E}">
+        <p14:creationId xmlns:p14="http://schemas.microsoft.com/office/powerpoint/2010/main" val="2539354491"/>
+      </p:ext>
+    </p:extLst>
+  </p:cSld>
+  <p:clrMapOvr>
+    <a:masterClrMapping/>
+  </p:clrMapOvr>
+</p:sld>
+</file>
+
+<file path=ppt/slides/slide14.xml><?xml version="1.0" encoding="utf-8"?>
+<p:sld xmlns:a="http://schemas.openxmlformats.org/drawingml/2006/main" xmlns:r="http://schemas.openxmlformats.org/officeDocument/2006/relationships" xmlns:p="http://schemas.openxmlformats.org/presentationml/2006/main">
+  <p:cSld>
+    <p:spTree>
+      <p:nvGrpSpPr>
+        <p:cNvPr id="1" name=""/>
+        <p:cNvGrpSpPr/>
+        <p:nvPr/>
+      </p:nvGrpSpPr>
+      <p:grpSpPr>
+        <a:xfrm>
+          <a:off x="0" y="0"/>
+          <a:ext cx="0" cy="0"/>
+          <a:chOff x="0" y="0"/>
+          <a:chExt cx="0" cy="0"/>
+        </a:xfrm>
+      </p:grpSpPr>
+      <p:pic>
+        <p:nvPicPr>
+          <p:cNvPr id="4" name="図 3">
+            <a:extLst>
+              <a:ext uri="{FF2B5EF4-FFF2-40B4-BE49-F238E27FC236}">
+                <a16:creationId xmlns:a16="http://schemas.microsoft.com/office/drawing/2014/main" id="{01BDD99F-402F-4A55-A495-D5817C0B13DA}"/>
+              </a:ext>
+            </a:extLst>
+          </p:cNvPr>
+          <p:cNvPicPr>
+            <a:picLocks noChangeAspect="1"/>
+          </p:cNvPicPr>
+          <p:nvPr/>
+        </p:nvPicPr>
+        <p:blipFill>
+          <a:blip r:embed="rId2"/>
+          <a:stretch>
+            <a:fillRect/>
+          </a:stretch>
+        </p:blipFill>
+        <p:spPr>
+          <a:xfrm>
+            <a:off x="302004" y="238465"/>
+            <a:ext cx="8575214" cy="4794930"/>
+          </a:xfrm>
+          <a:prstGeom prst="rect">
+            <a:avLst/>
+          </a:prstGeom>
+        </p:spPr>
+      </p:pic>
+      <p:sp>
+        <p:nvSpPr>
+          <p:cNvPr id="5" name="正方形/長方形 4">
+            <a:extLst>
+              <a:ext uri="{FF2B5EF4-FFF2-40B4-BE49-F238E27FC236}">
+                <a16:creationId xmlns:a16="http://schemas.microsoft.com/office/drawing/2014/main" id="{BFFF4589-8867-4CBD-895C-6528E21C8CE9}"/>
+              </a:ext>
+            </a:extLst>
+          </p:cNvPr>
+          <p:cNvSpPr/>
+          <p:nvPr/>
+        </p:nvSpPr>
+        <p:spPr>
+          <a:xfrm>
+            <a:off x="3741490" y="1971413"/>
+            <a:ext cx="2379677" cy="167780"/>
+          </a:xfrm>
+          <a:prstGeom prst="rect">
+            <a:avLst/>
+          </a:prstGeom>
+          <a:noFill/>
+          <a:ln w="25400">
+            <a:solidFill>
+              <a:srgbClr val="FF0000"/>
+            </a:solidFill>
+          </a:ln>
+        </p:spPr>
+        <p:style>
+          <a:lnRef idx="2">
+            <a:schemeClr val="accent1">
+              <a:shade val="50000"/>
+            </a:schemeClr>
+          </a:lnRef>
+          <a:fillRef idx="1">
+            <a:schemeClr val="accent1"/>
+          </a:fillRef>
+          <a:effectRef idx="0">
+            <a:schemeClr val="accent1"/>
+          </a:effectRef>
+          <a:fontRef idx="minor">
+            <a:schemeClr val="lt1"/>
+          </a:fontRef>
+        </p:style>
+        <p:txBody>
+          <a:bodyPr rtlCol="0" anchor="ctr"/>
+          <a:lstStyle/>
+          <a:p>
+            <a:pPr algn="ctr"/>
+            <a:endParaRPr lang="en-US"/>
+          </a:p>
+        </p:txBody>
+      </p:sp>
+      <p:sp>
+        <p:nvSpPr>
+          <p:cNvPr id="6" name="正方形/長方形 5">
+            <a:extLst>
+              <a:ext uri="{FF2B5EF4-FFF2-40B4-BE49-F238E27FC236}">
+                <a16:creationId xmlns:a16="http://schemas.microsoft.com/office/drawing/2014/main" id="{D4D5A786-F03F-496D-9BA3-5F0B724C4243}"/>
+              </a:ext>
+            </a:extLst>
+          </p:cNvPr>
+          <p:cNvSpPr/>
+          <p:nvPr/>
+        </p:nvSpPr>
+        <p:spPr>
+          <a:xfrm>
+            <a:off x="3507996" y="2132202"/>
+            <a:ext cx="2613171" cy="167780"/>
+          </a:xfrm>
+          <a:prstGeom prst="rect">
+            <a:avLst/>
+          </a:prstGeom>
+          <a:noFill/>
+          <a:ln w="25400">
+            <a:solidFill>
+              <a:srgbClr val="FF0000"/>
+            </a:solidFill>
+          </a:ln>
+        </p:spPr>
+        <p:style>
+          <a:lnRef idx="2">
+            <a:schemeClr val="accent1">
+              <a:shade val="50000"/>
+            </a:schemeClr>
+          </a:lnRef>
+          <a:fillRef idx="1">
+            <a:schemeClr val="accent1"/>
+          </a:fillRef>
+          <a:effectRef idx="0">
+            <a:schemeClr val="accent1"/>
+          </a:effectRef>
+          <a:fontRef idx="minor">
+            <a:schemeClr val="lt1"/>
+          </a:fontRef>
+        </p:style>
+        <p:txBody>
+          <a:bodyPr rtlCol="0" anchor="ctr"/>
+          <a:lstStyle/>
+          <a:p>
+            <a:pPr algn="ctr"/>
+            <a:endParaRPr lang="en-US"/>
+          </a:p>
+        </p:txBody>
+      </p:sp>
+      <p:sp>
+        <p:nvSpPr>
+          <p:cNvPr id="7" name="正方形/長方形 6">
+            <a:extLst>
+              <a:ext uri="{FF2B5EF4-FFF2-40B4-BE49-F238E27FC236}">
+                <a16:creationId xmlns:a16="http://schemas.microsoft.com/office/drawing/2014/main" id="{E3A5AF5F-E390-4839-B788-983220FF94CC}"/>
+              </a:ext>
+            </a:extLst>
+          </p:cNvPr>
+          <p:cNvSpPr/>
+          <p:nvPr/>
+        </p:nvSpPr>
+        <p:spPr>
+          <a:xfrm>
+            <a:off x="3098334" y="3303165"/>
+            <a:ext cx="1683392" cy="167780"/>
+          </a:xfrm>
+          <a:prstGeom prst="rect">
+            <a:avLst/>
+          </a:prstGeom>
+          <a:noFill/>
+          <a:ln w="25400">
+            <a:solidFill>
+              <a:srgbClr val="FF0000"/>
+            </a:solidFill>
+          </a:ln>
+        </p:spPr>
+        <p:style>
+          <a:lnRef idx="2">
+            <a:schemeClr val="accent1">
+              <a:shade val="50000"/>
+            </a:schemeClr>
+          </a:lnRef>
+          <a:fillRef idx="1">
+            <a:schemeClr val="accent1"/>
+          </a:fillRef>
+          <a:effectRef idx="0">
+            <a:schemeClr val="accent1"/>
+          </a:effectRef>
+          <a:fontRef idx="minor">
+            <a:schemeClr val="lt1"/>
+          </a:fontRef>
+        </p:style>
+        <p:txBody>
+          <a:bodyPr rtlCol="0" anchor="ctr"/>
+          <a:lstStyle/>
+          <a:p>
+            <a:pPr algn="ctr"/>
+            <a:endParaRPr lang="en-US"/>
+          </a:p>
+        </p:txBody>
+      </p:sp>
+      <p:cxnSp>
+        <p:nvCxnSpPr>
+          <p:cNvPr id="9" name="直線コネクタ 8">
+            <a:extLst>
+              <a:ext uri="{FF2B5EF4-FFF2-40B4-BE49-F238E27FC236}">
+                <a16:creationId xmlns:a16="http://schemas.microsoft.com/office/drawing/2014/main" id="{E7488077-FCD6-4A5A-8FB0-6C9BD943AFB8}"/>
+              </a:ext>
+            </a:extLst>
+          </p:cNvPr>
+          <p:cNvCxnSpPr>
+            <a:cxnSpLocks/>
+          </p:cNvCxnSpPr>
+          <p:nvPr/>
+        </p:nvCxnSpPr>
+        <p:spPr>
+          <a:xfrm>
+            <a:off x="3390550" y="3982675"/>
+            <a:ext cx="1609289" cy="0"/>
+          </a:xfrm>
+          <a:prstGeom prst="line">
+            <a:avLst/>
+          </a:prstGeom>
+          <a:ln w="28575">
+            <a:solidFill>
+              <a:srgbClr val="FF0000"/>
+            </a:solidFill>
+          </a:ln>
+        </p:spPr>
+        <p:style>
+          <a:lnRef idx="1">
+            <a:schemeClr val="accent1"/>
+          </a:lnRef>
+          <a:fillRef idx="0">
+            <a:schemeClr val="accent1"/>
+          </a:fillRef>
+          <a:effectRef idx="0">
+            <a:schemeClr val="accent1"/>
+          </a:effectRef>
+          <a:fontRef idx="minor">
+            <a:schemeClr val="tx1"/>
+          </a:fontRef>
+        </p:style>
+      </p:cxnSp>
+      <p:cxnSp>
+        <p:nvCxnSpPr>
+          <p:cNvPr id="13" name="直線コネクタ 12">
+            <a:extLst>
+              <a:ext uri="{FF2B5EF4-FFF2-40B4-BE49-F238E27FC236}">
+                <a16:creationId xmlns:a16="http://schemas.microsoft.com/office/drawing/2014/main" id="{008A9BFF-5188-464D-A764-07AD5D0AA5FE}"/>
+              </a:ext>
+            </a:extLst>
+          </p:cNvPr>
+          <p:cNvCxnSpPr>
+            <a:cxnSpLocks/>
+          </p:cNvCxnSpPr>
+          <p:nvPr/>
+        </p:nvCxnSpPr>
+        <p:spPr>
+          <a:xfrm>
+            <a:off x="3390550" y="4210576"/>
+            <a:ext cx="1953237" cy="0"/>
+          </a:xfrm>
+          <a:prstGeom prst="line">
+            <a:avLst/>
+          </a:prstGeom>
+          <a:ln w="28575">
+            <a:solidFill>
+              <a:srgbClr val="FF0000"/>
+            </a:solidFill>
+          </a:ln>
+        </p:spPr>
+        <p:style>
+          <a:lnRef idx="1">
+            <a:schemeClr val="accent1"/>
+          </a:lnRef>
+          <a:fillRef idx="0">
+            <a:schemeClr val="accent1"/>
+          </a:fillRef>
+          <a:effectRef idx="0">
+            <a:schemeClr val="accent1"/>
+          </a:effectRef>
+          <a:fontRef idx="minor">
+            <a:schemeClr val="tx1"/>
+          </a:fontRef>
+        </p:style>
+      </p:cxnSp>
+      <p:sp>
+        <p:nvSpPr>
+          <p:cNvPr id="15" name="正方形/長方形 14">
+            <a:extLst>
+              <a:ext uri="{FF2B5EF4-FFF2-40B4-BE49-F238E27FC236}">
+                <a16:creationId xmlns:a16="http://schemas.microsoft.com/office/drawing/2014/main" id="{75C1804A-2A43-4823-88AB-356E24AA2947}"/>
+              </a:ext>
+            </a:extLst>
+          </p:cNvPr>
+          <p:cNvSpPr/>
+          <p:nvPr/>
+        </p:nvSpPr>
+        <p:spPr>
+          <a:xfrm>
+            <a:off x="7418665" y="3301068"/>
+            <a:ext cx="167780" cy="608202"/>
+          </a:xfrm>
+          <a:prstGeom prst="rect">
+            <a:avLst/>
+          </a:prstGeom>
+          <a:noFill/>
+          <a:ln w="25400">
+            <a:solidFill>
+              <a:srgbClr val="FF0000"/>
+            </a:solidFill>
+          </a:ln>
+        </p:spPr>
+        <p:style>
+          <a:lnRef idx="2">
+            <a:schemeClr val="accent1">
+              <a:shade val="50000"/>
+            </a:schemeClr>
+          </a:lnRef>
+          <a:fillRef idx="1">
+            <a:schemeClr val="accent1"/>
+          </a:fillRef>
+          <a:effectRef idx="0">
+            <a:schemeClr val="accent1"/>
+          </a:effectRef>
+          <a:fontRef idx="minor">
+            <a:schemeClr val="lt1"/>
+          </a:fontRef>
+        </p:style>
+        <p:txBody>
+          <a:bodyPr rtlCol="0" anchor="ctr"/>
+          <a:lstStyle/>
+          <a:p>
+            <a:pPr algn="ctr"/>
+            <a:endParaRPr lang="en-US"/>
+          </a:p>
+        </p:txBody>
+      </p:sp>
+    </p:spTree>
+    <p:extLst>
+      <p:ext uri="{BB962C8B-B14F-4D97-AF65-F5344CB8AC3E}">
+        <p14:creationId xmlns:p14="http://schemas.microsoft.com/office/powerpoint/2010/main" val="8039550"/>
       </p:ext>
     </p:extLst>
   </p:cSld>

</xml_diff>

<commit_message>
[main] Update resources and fix typo.
</commit_message>
<xml_diff>
--- a/Resources/Part1/Part1_Resources.pptx
+++ b/Resources/Part1/Part1_Resources.pptx
@@ -13577,7 +13577,7 @@
           <a:p>
             <a:fld id="{1A086832-2622-4354-BD9D-64D40320B320}" type="datetimeFigureOut">
               <a:rPr kumimoji="1" lang="ja-JP" altLang="en-US" smtClean="0"/>
-              <a:t>2024/11/3</a:t>
+              <a:t>2024/11/7</a:t>
             </a:fld>
             <a:endParaRPr kumimoji="1" lang="ja-JP" altLang="en-US"/>
           </a:p>
@@ -13807,7 +13807,7 @@
           <a:p>
             <a:fld id="{1A086832-2622-4354-BD9D-64D40320B320}" type="datetimeFigureOut">
               <a:rPr kumimoji="1" lang="ja-JP" altLang="en-US" smtClean="0"/>
-              <a:t>2024/11/3</a:t>
+              <a:t>2024/11/7</a:t>
             </a:fld>
             <a:endParaRPr kumimoji="1" lang="ja-JP" altLang="en-US"/>
           </a:p>
@@ -14047,7 +14047,7 @@
           <a:p>
             <a:fld id="{1A086832-2622-4354-BD9D-64D40320B320}" type="datetimeFigureOut">
               <a:rPr kumimoji="1" lang="ja-JP" altLang="en-US" smtClean="0"/>
-              <a:t>2024/11/3</a:t>
+              <a:t>2024/11/7</a:t>
             </a:fld>
             <a:endParaRPr kumimoji="1" lang="ja-JP" altLang="en-US"/>
           </a:p>
@@ -14277,7 +14277,7 @@
           <a:p>
             <a:fld id="{1A086832-2622-4354-BD9D-64D40320B320}" type="datetimeFigureOut">
               <a:rPr kumimoji="1" lang="ja-JP" altLang="en-US" smtClean="0"/>
-              <a:t>2024/11/3</a:t>
+              <a:t>2024/11/7</a:t>
             </a:fld>
             <a:endParaRPr kumimoji="1" lang="ja-JP" altLang="en-US"/>
           </a:p>
@@ -14552,7 +14552,7 @@
           <a:p>
             <a:fld id="{1A086832-2622-4354-BD9D-64D40320B320}" type="datetimeFigureOut">
               <a:rPr kumimoji="1" lang="ja-JP" altLang="en-US" smtClean="0"/>
-              <a:t>2024/11/3</a:t>
+              <a:t>2024/11/7</a:t>
             </a:fld>
             <a:endParaRPr kumimoji="1" lang="ja-JP" altLang="en-US"/>
           </a:p>
@@ -14881,7 +14881,7 @@
           <a:p>
             <a:fld id="{1A086832-2622-4354-BD9D-64D40320B320}" type="datetimeFigureOut">
               <a:rPr kumimoji="1" lang="ja-JP" altLang="en-US" smtClean="0"/>
-              <a:t>2024/11/3</a:t>
+              <a:t>2024/11/7</a:t>
             </a:fld>
             <a:endParaRPr kumimoji="1" lang="ja-JP" altLang="en-US"/>
           </a:p>
@@ -15357,7 +15357,7 @@
           <a:p>
             <a:fld id="{1A086832-2622-4354-BD9D-64D40320B320}" type="datetimeFigureOut">
               <a:rPr kumimoji="1" lang="ja-JP" altLang="en-US" smtClean="0"/>
-              <a:t>2024/11/3</a:t>
+              <a:t>2024/11/7</a:t>
             </a:fld>
             <a:endParaRPr kumimoji="1" lang="ja-JP" altLang="en-US"/>
           </a:p>
@@ -15498,7 +15498,7 @@
           <a:p>
             <a:fld id="{1A086832-2622-4354-BD9D-64D40320B320}" type="datetimeFigureOut">
               <a:rPr kumimoji="1" lang="ja-JP" altLang="en-US" smtClean="0"/>
-              <a:t>2024/11/3</a:t>
+              <a:t>2024/11/7</a:t>
             </a:fld>
             <a:endParaRPr kumimoji="1" lang="ja-JP" altLang="en-US"/>
           </a:p>
@@ -15611,7 +15611,7 @@
           <a:p>
             <a:fld id="{1A086832-2622-4354-BD9D-64D40320B320}" type="datetimeFigureOut">
               <a:rPr kumimoji="1" lang="ja-JP" altLang="en-US" smtClean="0"/>
-              <a:t>2024/11/3</a:t>
+              <a:t>2024/11/7</a:t>
             </a:fld>
             <a:endParaRPr kumimoji="1" lang="ja-JP" altLang="en-US"/>
           </a:p>
@@ -15954,7 +15954,7 @@
           <a:p>
             <a:fld id="{1A086832-2622-4354-BD9D-64D40320B320}" type="datetimeFigureOut">
               <a:rPr kumimoji="1" lang="ja-JP" altLang="en-US" smtClean="0"/>
-              <a:t>2024/11/3</a:t>
+              <a:t>2024/11/7</a:t>
             </a:fld>
             <a:endParaRPr kumimoji="1" lang="ja-JP" altLang="en-US"/>
           </a:p>
@@ -16242,7 +16242,7 @@
           <a:p>
             <a:fld id="{1A086832-2622-4354-BD9D-64D40320B320}" type="datetimeFigureOut">
               <a:rPr kumimoji="1" lang="ja-JP" altLang="en-US" smtClean="0"/>
-              <a:t>2024/11/3</a:t>
+              <a:t>2024/11/7</a:t>
             </a:fld>
             <a:endParaRPr kumimoji="1" lang="ja-JP" altLang="en-US"/>
           </a:p>
@@ -16515,7 +16515,7 @@
           <a:p>
             <a:fld id="{1A086832-2622-4354-BD9D-64D40320B320}" type="datetimeFigureOut">
               <a:rPr kumimoji="1" lang="ja-JP" altLang="en-US" smtClean="0"/>
-              <a:t>2024/11/3</a:t>
+              <a:t>2024/11/7</a:t>
             </a:fld>
             <a:endParaRPr kumimoji="1" lang="ja-JP" altLang="en-US"/>
           </a:p>
@@ -20004,7 +20004,7 @@
             <a:chExt cx="1169789" cy="718839"/>
           </a:xfrm>
           <a:solidFill>
-            <a:schemeClr val="accent3">
+            <a:schemeClr val="accent1">
               <a:lumMod val="60000"/>
               <a:lumOff val="40000"/>
             </a:schemeClr>

</xml_diff>